<commit_message>
wrote a 第八章 file
</commit_message>
<xml_diff>
--- a/第八章.pptx
+++ b/第八章.pptx
@@ -5,21 +5,29 @@
     <p:sldMasterId id="2147483648" r:id="rId1"/>
   </p:sldMasterIdLst>
   <p:sldIdLst>
-    <p:sldId id="256" r:id="rId3"/>
-    <p:sldId id="257" r:id="rId4"/>
-    <p:sldId id="258" r:id="rId5"/>
-    <p:sldId id="259" r:id="rId6"/>
-    <p:sldId id="260" r:id="rId7"/>
-    <p:sldId id="261" r:id="rId8"/>
-    <p:sldId id="262" r:id="rId9"/>
-    <p:sldId id="263" r:id="rId10"/>
-    <p:sldId id="264" r:id="rId11"/>
-    <p:sldId id="265" r:id="rId12"/>
-    <p:sldId id="266" r:id="rId13"/>
-    <p:sldId id="267" r:id="rId14"/>
+    <p:sldId id="256" r:id="rId2"/>
+    <p:sldId id="257" r:id="rId3"/>
+    <p:sldId id="258" r:id="rId4"/>
+    <p:sldId id="259" r:id="rId5"/>
+    <p:sldId id="260" r:id="rId6"/>
+    <p:sldId id="261" r:id="rId7"/>
+    <p:sldId id="262" r:id="rId8"/>
+    <p:sldId id="263" r:id="rId9"/>
+    <p:sldId id="264" r:id="rId10"/>
+    <p:sldId id="265" r:id="rId11"/>
+    <p:sldId id="266" r:id="rId12"/>
+    <p:sldId id="267" r:id="rId13"/>
+    <p:sldId id="268" r:id="rId14"/>
+    <p:sldId id="269" r:id="rId15"/>
+    <p:sldId id="270" r:id="rId16"/>
+    <p:sldId id="271" r:id="rId17"/>
+    <p:sldId id="272" r:id="rId18"/>
+    <p:sldId id="273" r:id="rId19"/>
+    <p:sldId id="274" r:id="rId20"/>
+    <p:sldId id="275" r:id="rId21"/>
   </p:sldIdLst>
   <p:sldSz cx="12192000" cy="6858000"/>
-  <p:notesSz cx="7103745" cy="10234295"/>
+  <p:notesSz cx="7104063" cy="10234613"/>
   <p:defaultTextStyle>
     <a:defPPr>
       <a:defRPr lang="zh-CN"/>
@@ -249,6 +257,7 @@
           <a:p>
             <a:fld id="{82F288E0-7875-42C4-84C8-98DBBD3BF4D2}" type="datetimeFigureOut">
               <a:rPr lang="zh-CN" altLang="en-US" smtClean="0"/>
+              <a:t>2018/10/20</a:t>
             </a:fld>
             <a:endParaRPr lang="zh-CN" altLang="en-US"/>
           </a:p>
@@ -290,6 +299,7 @@
           <a:p>
             <a:fld id="{7D9BB5D0-35E4-459D-AEF3-FE4D7C45CC19}" type="slidenum">
               <a:rPr lang="zh-CN" altLang="en-US" smtClean="0"/>
+              <a:t>‹#›</a:t>
             </a:fld>
             <a:endParaRPr lang="zh-CN" altLang="en-US"/>
           </a:p>
@@ -345,7 +355,6 @@
               <a:rPr lang="zh-CN" altLang="en-US" smtClean="0"/>
               <a:t>单击此处编辑母版文本样式</a:t>
             </a:r>
-            <a:endParaRPr lang="zh-CN" altLang="en-US" smtClean="0"/>
           </a:p>
           <a:p>
             <a:pPr lvl="1"/>
@@ -353,7 +362,6 @@
               <a:rPr lang="zh-CN" altLang="en-US" smtClean="0"/>
               <a:t>第二级</a:t>
             </a:r>
-            <a:endParaRPr lang="zh-CN" altLang="en-US" smtClean="0"/>
           </a:p>
           <a:p>
             <a:pPr lvl="2"/>
@@ -361,7 +369,6 @@
               <a:rPr lang="zh-CN" altLang="en-US" smtClean="0"/>
               <a:t>第三级</a:t>
             </a:r>
-            <a:endParaRPr lang="zh-CN" altLang="en-US" smtClean="0"/>
           </a:p>
           <a:p>
             <a:pPr lvl="3"/>
@@ -369,7 +376,6 @@
               <a:rPr lang="zh-CN" altLang="en-US" smtClean="0"/>
               <a:t>第四级</a:t>
             </a:r>
-            <a:endParaRPr lang="zh-CN" altLang="en-US" smtClean="0"/>
           </a:p>
           <a:p>
             <a:pPr lvl="4"/>
@@ -398,6 +404,7 @@
           <a:p>
             <a:fld id="{82F288E0-7875-42C4-84C8-98DBBD3BF4D2}" type="datetimeFigureOut">
               <a:rPr lang="zh-CN" altLang="en-US" smtClean="0"/>
+              <a:t>2018/10/20</a:t>
             </a:fld>
             <a:endParaRPr lang="zh-CN" altLang="en-US"/>
           </a:p>
@@ -439,6 +446,7 @@
           <a:p>
             <a:fld id="{7D9BB5D0-35E4-459D-AEF3-FE4D7C45CC19}" type="slidenum">
               <a:rPr lang="zh-CN" altLang="en-US" smtClean="0"/>
+              <a:t>‹#›</a:t>
             </a:fld>
             <a:endParaRPr lang="zh-CN" altLang="en-US"/>
           </a:p>
@@ -512,7 +520,6 @@
               <a:rPr lang="zh-CN" altLang="en-US" smtClean="0"/>
               <a:t>单击此处编辑母版文本样式</a:t>
             </a:r>
-            <a:endParaRPr lang="zh-CN" altLang="en-US" smtClean="0"/>
           </a:p>
           <a:p>
             <a:pPr lvl="1"/>
@@ -520,7 +527,6 @@
               <a:rPr lang="zh-CN" altLang="en-US" smtClean="0"/>
               <a:t>第二级</a:t>
             </a:r>
-            <a:endParaRPr lang="zh-CN" altLang="en-US" smtClean="0"/>
           </a:p>
           <a:p>
             <a:pPr lvl="2"/>
@@ -528,7 +534,6 @@
               <a:rPr lang="zh-CN" altLang="en-US" smtClean="0"/>
               <a:t>第三级</a:t>
             </a:r>
-            <a:endParaRPr lang="zh-CN" altLang="en-US" smtClean="0"/>
           </a:p>
           <a:p>
             <a:pPr lvl="3"/>
@@ -536,7 +541,6 @@
               <a:rPr lang="zh-CN" altLang="en-US" smtClean="0"/>
               <a:t>第四级</a:t>
             </a:r>
-            <a:endParaRPr lang="zh-CN" altLang="en-US" smtClean="0"/>
           </a:p>
           <a:p>
             <a:pPr lvl="4"/>
@@ -565,6 +569,7 @@
           <a:p>
             <a:fld id="{82F288E0-7875-42C4-84C8-98DBBD3BF4D2}" type="datetimeFigureOut">
               <a:rPr lang="zh-CN" altLang="en-US" smtClean="0"/>
+              <a:t>2018/10/20</a:t>
             </a:fld>
             <a:endParaRPr lang="zh-CN" altLang="en-US"/>
           </a:p>
@@ -606,6 +611,7 @@
           <a:p>
             <a:fld id="{7D9BB5D0-35E4-459D-AEF3-FE4D7C45CC19}" type="slidenum">
               <a:rPr lang="zh-CN" altLang="en-US" smtClean="0"/>
+              <a:t>‹#›</a:t>
             </a:fld>
             <a:endParaRPr lang="zh-CN" altLang="en-US"/>
           </a:p>
@@ -784,7 +790,6 @@
               <a:rPr lang="zh-CN" altLang="en-US" smtClean="0"/>
               <a:t>单击此处编辑母版文本样式</a:t>
             </a:r>
-            <a:endParaRPr lang="zh-CN" altLang="en-US" smtClean="0"/>
           </a:p>
         </p:txBody>
       </p:sp>
@@ -805,6 +810,7 @@
           <a:p>
             <a:fld id="{82F288E0-7875-42C4-84C8-98DBBD3BF4D2}" type="datetimeFigureOut">
               <a:rPr lang="zh-CN" altLang="en-US" smtClean="0"/>
+              <a:t>2018/10/20</a:t>
             </a:fld>
             <a:endParaRPr lang="zh-CN" altLang="en-US"/>
           </a:p>
@@ -846,6 +852,7 @@
           <a:p>
             <a:fld id="{7D9BB5D0-35E4-459D-AEF3-FE4D7C45CC19}" type="slidenum">
               <a:rPr lang="zh-CN" altLang="en-US" smtClean="0"/>
+              <a:t>‹#›</a:t>
             </a:fld>
             <a:endParaRPr lang="zh-CN" altLang="en-US"/>
           </a:p>
@@ -924,7 +931,6 @@
               <a:rPr lang="zh-CN" altLang="en-US" smtClean="0"/>
               <a:t>单击此处编辑母版文本样式</a:t>
             </a:r>
-            <a:endParaRPr lang="zh-CN" altLang="en-US" smtClean="0"/>
           </a:p>
           <a:p>
             <a:pPr lvl="1"/>
@@ -932,7 +938,6 @@
               <a:rPr lang="zh-CN" altLang="en-US" smtClean="0"/>
               <a:t>第二级</a:t>
             </a:r>
-            <a:endParaRPr lang="zh-CN" altLang="en-US" smtClean="0"/>
           </a:p>
           <a:p>
             <a:pPr lvl="2"/>
@@ -940,7 +945,6 @@
               <a:rPr lang="zh-CN" altLang="en-US" smtClean="0"/>
               <a:t>第三级</a:t>
             </a:r>
-            <a:endParaRPr lang="zh-CN" altLang="en-US" smtClean="0"/>
           </a:p>
           <a:p>
             <a:pPr lvl="3"/>
@@ -948,7 +952,6 @@
               <a:rPr lang="zh-CN" altLang="en-US" smtClean="0"/>
               <a:t>第四级</a:t>
             </a:r>
-            <a:endParaRPr lang="zh-CN" altLang="en-US" smtClean="0"/>
           </a:p>
           <a:p>
             <a:pPr lvl="4"/>
@@ -985,7 +988,6 @@
               <a:rPr lang="zh-CN" altLang="en-US" smtClean="0"/>
               <a:t>单击此处编辑母版文本样式</a:t>
             </a:r>
-            <a:endParaRPr lang="zh-CN" altLang="en-US" smtClean="0"/>
           </a:p>
           <a:p>
             <a:pPr lvl="1"/>
@@ -993,7 +995,6 @@
               <a:rPr lang="zh-CN" altLang="en-US" smtClean="0"/>
               <a:t>第二级</a:t>
             </a:r>
-            <a:endParaRPr lang="zh-CN" altLang="en-US" smtClean="0"/>
           </a:p>
           <a:p>
             <a:pPr lvl="2"/>
@@ -1001,7 +1002,6 @@
               <a:rPr lang="zh-CN" altLang="en-US" smtClean="0"/>
               <a:t>第三级</a:t>
             </a:r>
-            <a:endParaRPr lang="zh-CN" altLang="en-US" smtClean="0"/>
           </a:p>
           <a:p>
             <a:pPr lvl="3"/>
@@ -1009,7 +1009,6 @@
               <a:rPr lang="zh-CN" altLang="en-US" smtClean="0"/>
               <a:t>第四级</a:t>
             </a:r>
-            <a:endParaRPr lang="zh-CN" altLang="en-US" smtClean="0"/>
           </a:p>
           <a:p>
             <a:pPr lvl="4"/>
@@ -1038,6 +1037,7 @@
           <a:p>
             <a:fld id="{82F288E0-7875-42C4-84C8-98DBBD3BF4D2}" type="datetimeFigureOut">
               <a:rPr lang="zh-CN" altLang="en-US" smtClean="0"/>
+              <a:t>2018/10/20</a:t>
             </a:fld>
             <a:endParaRPr lang="zh-CN" altLang="en-US"/>
           </a:p>
@@ -1079,6 +1079,7 @@
           <a:p>
             <a:fld id="{7D9BB5D0-35E4-459D-AEF3-FE4D7C45CC19}" type="slidenum">
               <a:rPr lang="zh-CN" altLang="en-US" smtClean="0"/>
+              <a:t>‹#›</a:t>
             </a:fld>
             <a:endParaRPr lang="zh-CN" altLang="en-US"/>
           </a:p>
@@ -1199,7 +1200,6 @@
               <a:rPr lang="zh-CN" altLang="en-US" smtClean="0"/>
               <a:t>单击此处编辑母版文本样式</a:t>
             </a:r>
-            <a:endParaRPr lang="zh-CN" altLang="en-US" smtClean="0"/>
           </a:p>
         </p:txBody>
       </p:sp>
@@ -1228,7 +1228,6 @@
               <a:rPr lang="zh-CN" altLang="en-US" smtClean="0"/>
               <a:t>单击此处编辑母版文本样式</a:t>
             </a:r>
-            <a:endParaRPr lang="zh-CN" altLang="en-US" smtClean="0"/>
           </a:p>
           <a:p>
             <a:pPr lvl="1"/>
@@ -1236,7 +1235,6 @@
               <a:rPr lang="zh-CN" altLang="en-US" smtClean="0"/>
               <a:t>第二级</a:t>
             </a:r>
-            <a:endParaRPr lang="zh-CN" altLang="en-US" smtClean="0"/>
           </a:p>
           <a:p>
             <a:pPr lvl="2"/>
@@ -1244,7 +1242,6 @@
               <a:rPr lang="zh-CN" altLang="en-US" smtClean="0"/>
               <a:t>第三级</a:t>
             </a:r>
-            <a:endParaRPr lang="zh-CN" altLang="en-US" smtClean="0"/>
           </a:p>
           <a:p>
             <a:pPr lvl="3"/>
@@ -1252,7 +1249,6 @@
               <a:rPr lang="zh-CN" altLang="en-US" smtClean="0"/>
               <a:t>第四级</a:t>
             </a:r>
-            <a:endParaRPr lang="zh-CN" altLang="en-US" smtClean="0"/>
           </a:p>
           <a:p>
             <a:pPr lvl="4"/>
@@ -1326,7 +1322,6 @@
               <a:rPr lang="zh-CN" altLang="en-US" smtClean="0"/>
               <a:t>单击此处编辑母版文本样式</a:t>
             </a:r>
-            <a:endParaRPr lang="zh-CN" altLang="en-US" smtClean="0"/>
           </a:p>
         </p:txBody>
       </p:sp>
@@ -1355,7 +1350,6 @@
               <a:rPr lang="zh-CN" altLang="en-US" smtClean="0"/>
               <a:t>单击此处编辑母版文本样式</a:t>
             </a:r>
-            <a:endParaRPr lang="zh-CN" altLang="en-US" smtClean="0"/>
           </a:p>
           <a:p>
             <a:pPr lvl="1"/>
@@ -1363,7 +1357,6 @@
               <a:rPr lang="zh-CN" altLang="en-US" smtClean="0"/>
               <a:t>第二级</a:t>
             </a:r>
-            <a:endParaRPr lang="zh-CN" altLang="en-US" smtClean="0"/>
           </a:p>
           <a:p>
             <a:pPr lvl="2"/>
@@ -1371,7 +1364,6 @@
               <a:rPr lang="zh-CN" altLang="en-US" smtClean="0"/>
               <a:t>第三级</a:t>
             </a:r>
-            <a:endParaRPr lang="zh-CN" altLang="en-US" smtClean="0"/>
           </a:p>
           <a:p>
             <a:pPr lvl="3"/>
@@ -1379,7 +1371,6 @@
               <a:rPr lang="zh-CN" altLang="en-US" smtClean="0"/>
               <a:t>第四级</a:t>
             </a:r>
-            <a:endParaRPr lang="zh-CN" altLang="en-US" smtClean="0"/>
           </a:p>
           <a:p>
             <a:pPr lvl="4"/>
@@ -1408,6 +1399,7 @@
           <a:p>
             <a:fld id="{82F288E0-7875-42C4-84C8-98DBBD3BF4D2}" type="datetimeFigureOut">
               <a:rPr lang="zh-CN" altLang="en-US" smtClean="0"/>
+              <a:t>2018/10/20</a:t>
             </a:fld>
             <a:endParaRPr lang="zh-CN" altLang="en-US"/>
           </a:p>
@@ -1449,6 +1441,7 @@
           <a:p>
             <a:fld id="{7D9BB5D0-35E4-459D-AEF3-FE4D7C45CC19}" type="slidenum">
               <a:rPr lang="zh-CN" altLang="en-US" smtClean="0"/>
+              <a:t>‹#›</a:t>
             </a:fld>
             <a:endParaRPr lang="zh-CN" altLang="en-US"/>
           </a:p>
@@ -1519,6 +1512,7 @@
           <a:p>
             <a:fld id="{82F288E0-7875-42C4-84C8-98DBBD3BF4D2}" type="datetimeFigureOut">
               <a:rPr lang="zh-CN" altLang="en-US" smtClean="0"/>
+              <a:t>2018/10/20</a:t>
             </a:fld>
             <a:endParaRPr lang="zh-CN" altLang="en-US"/>
           </a:p>
@@ -1560,6 +1554,7 @@
           <a:p>
             <a:fld id="{7D9BB5D0-35E4-459D-AEF3-FE4D7C45CC19}" type="slidenum">
               <a:rPr lang="zh-CN" altLang="en-US" smtClean="0"/>
+              <a:t>‹#›</a:t>
             </a:fld>
             <a:endParaRPr lang="zh-CN" altLang="en-US"/>
           </a:p>
@@ -1607,6 +1602,7 @@
           <a:p>
             <a:fld id="{82F288E0-7875-42C4-84C8-98DBBD3BF4D2}" type="datetimeFigureOut">
               <a:rPr lang="zh-CN" altLang="en-US" smtClean="0"/>
+              <a:t>2018/10/20</a:t>
             </a:fld>
             <a:endParaRPr lang="zh-CN" altLang="en-US"/>
           </a:p>
@@ -1648,6 +1644,7 @@
           <a:p>
             <a:fld id="{7D9BB5D0-35E4-459D-AEF3-FE4D7C45CC19}" type="slidenum">
               <a:rPr lang="zh-CN" altLang="en-US" smtClean="0"/>
+              <a:t>‹#›</a:t>
             </a:fld>
             <a:endParaRPr lang="zh-CN" altLang="en-US"/>
           </a:p>
@@ -1833,7 +1830,6 @@
               <a:rPr lang="zh-CN" altLang="en-US" smtClean="0"/>
               <a:t>单击此处编辑母版文本样式</a:t>
             </a:r>
-            <a:endParaRPr lang="zh-CN" altLang="en-US" smtClean="0"/>
           </a:p>
         </p:txBody>
       </p:sp>
@@ -1854,6 +1850,7 @@
           <a:p>
             <a:fld id="{82F288E0-7875-42C4-84C8-98DBBD3BF4D2}" type="datetimeFigureOut">
               <a:rPr lang="zh-CN" altLang="en-US" smtClean="0"/>
+              <a:t>2018/10/20</a:t>
             </a:fld>
             <a:endParaRPr lang="zh-CN" altLang="en-US"/>
           </a:p>
@@ -1895,6 +1892,7 @@
           <a:p>
             <a:fld id="{7D9BB5D0-35E4-459D-AEF3-FE4D7C45CC19}" type="slidenum">
               <a:rPr lang="zh-CN" altLang="en-US" smtClean="0"/>
+              <a:t>‹#›</a:t>
             </a:fld>
             <a:endParaRPr lang="zh-CN" altLang="en-US"/>
           </a:p>
@@ -1978,7 +1976,6 @@
               <a:rPr lang="zh-CN" altLang="en-US" smtClean="0"/>
               <a:t>单击此处编辑母版文本样式</a:t>
             </a:r>
-            <a:endParaRPr lang="zh-CN" altLang="en-US" smtClean="0"/>
           </a:p>
           <a:p>
             <a:pPr lvl="1"/>
@@ -1986,7 +1983,6 @@
               <a:rPr lang="zh-CN" altLang="en-US" smtClean="0"/>
               <a:t>第二级</a:t>
             </a:r>
-            <a:endParaRPr lang="zh-CN" altLang="en-US" smtClean="0"/>
           </a:p>
           <a:p>
             <a:pPr lvl="2"/>
@@ -1994,7 +1990,6 @@
               <a:rPr lang="zh-CN" altLang="en-US" smtClean="0"/>
               <a:t>第三级</a:t>
             </a:r>
-            <a:endParaRPr lang="zh-CN" altLang="en-US" smtClean="0"/>
           </a:p>
           <a:p>
             <a:pPr lvl="3"/>
@@ -2002,7 +1997,6 @@
               <a:rPr lang="zh-CN" altLang="en-US" smtClean="0"/>
               <a:t>第四级</a:t>
             </a:r>
-            <a:endParaRPr lang="zh-CN" altLang="en-US" smtClean="0"/>
           </a:p>
           <a:p>
             <a:pPr lvl="4"/>
@@ -2031,6 +2025,7 @@
           <a:p>
             <a:fld id="{82F288E0-7875-42C4-84C8-98DBBD3BF4D2}" type="datetimeFigureOut">
               <a:rPr lang="zh-CN" altLang="en-US" smtClean="0"/>
+              <a:t>2018/10/20</a:t>
             </a:fld>
             <a:endParaRPr lang="zh-CN" altLang="en-US"/>
           </a:p>
@@ -2072,6 +2067,7 @@
           <a:p>
             <a:fld id="{7D9BB5D0-35E4-459D-AEF3-FE4D7C45CC19}" type="slidenum">
               <a:rPr lang="zh-CN" altLang="en-US" smtClean="0"/>
+              <a:t>‹#›</a:t>
             </a:fld>
             <a:endParaRPr lang="zh-CN" altLang="en-US"/>
           </a:p>
@@ -2170,7 +2166,6 @@
               <a:rPr lang="zh-CN" altLang="en-US" smtClean="0"/>
               <a:t>单击此处编辑母版文本样式</a:t>
             </a:r>
-            <a:endParaRPr lang="zh-CN" altLang="en-US" smtClean="0"/>
           </a:p>
           <a:p>
             <a:pPr lvl="1"/>
@@ -2178,7 +2173,6 @@
               <a:rPr lang="zh-CN" altLang="en-US" smtClean="0"/>
               <a:t>第二级</a:t>
             </a:r>
-            <a:endParaRPr lang="zh-CN" altLang="en-US" smtClean="0"/>
           </a:p>
           <a:p>
             <a:pPr lvl="2"/>
@@ -2186,7 +2180,6 @@
               <a:rPr lang="zh-CN" altLang="en-US" smtClean="0"/>
               <a:t>第三级</a:t>
             </a:r>
-            <a:endParaRPr lang="zh-CN" altLang="en-US" smtClean="0"/>
           </a:p>
           <a:p>
             <a:pPr lvl="3"/>
@@ -2194,7 +2187,6 @@
               <a:rPr lang="zh-CN" altLang="en-US" smtClean="0"/>
               <a:t>第四级</a:t>
             </a:r>
-            <a:endParaRPr lang="zh-CN" altLang="en-US" smtClean="0"/>
           </a:p>
           <a:p>
             <a:pPr lvl="4"/>
@@ -2241,6 +2233,7 @@
           <a:p>
             <a:fld id="{82F288E0-7875-42C4-84C8-98DBBD3BF4D2}" type="datetimeFigureOut">
               <a:rPr lang="zh-CN" altLang="en-US" smtClean="0"/>
+              <a:t>2018/10/20</a:t>
             </a:fld>
             <a:endParaRPr lang="zh-CN" altLang="en-US"/>
           </a:p>
@@ -2318,6 +2311,7 @@
           <a:p>
             <a:fld id="{7D9BB5D0-35E4-459D-AEF3-FE4D7C45CC19}" type="slidenum">
               <a:rPr lang="zh-CN" altLang="en-US" smtClean="0"/>
+              <a:t>‹#›</a:t>
             </a:fld>
             <a:endParaRPr lang="zh-CN" altLang="en-US"/>
           </a:p>
@@ -2630,7 +2624,14 @@
         <p:cNvGrpSpPr/>
         <p:nvPr/>
       </p:nvGrpSpPr>
-      <p:grpSpPr/>
+      <p:grpSpPr>
+        <a:xfrm>
+          <a:off x="0" y="0"/>
+          <a:ext cx="0" cy="0"/>
+          <a:chOff x="0" y="0"/>
+          <a:chExt cx="0" cy="0"/>
+        </a:xfrm>
+      </p:grpSpPr>
       <p:sp>
         <p:nvSpPr>
           <p:cNvPr id="2" name="标题 1"/>
@@ -2644,6 +2645,7 @@
         <p:spPr/>
         <p:txBody>
           <a:bodyPr/>
+          <a:lstStyle/>
           <a:p>
             <a:r>
               <a:rPr lang="zh-CN" altLang="en-US"/>
@@ -2653,7 +2655,6 @@
               <a:rPr lang="en-US" altLang="zh-CN"/>
               <a:t>——需求分析</a:t>
             </a:r>
-            <a:endParaRPr lang="en-US" altLang="zh-CN"/>
           </a:p>
         </p:txBody>
       </p:sp>
@@ -2670,12 +2671,12 @@
         <p:spPr/>
         <p:txBody>
           <a:bodyPr/>
+          <a:lstStyle/>
           <a:p>
             <a:r>
               <a:rPr lang="zh-CN" altLang="en-US"/>
               <a:t>樊子鹏</a:t>
             </a:r>
-            <a:endParaRPr lang="zh-CN" altLang="en-US"/>
           </a:p>
         </p:txBody>
       </p:sp>
@@ -2696,7 +2697,14 @@
         <p:cNvGrpSpPr/>
         <p:nvPr/>
       </p:nvGrpSpPr>
-      <p:grpSpPr/>
+      <p:grpSpPr>
+        <a:xfrm>
+          <a:off x="0" y="0"/>
+          <a:ext cx="0" cy="0"/>
+          <a:chOff x="0" y="0"/>
+          <a:chExt cx="0" cy="0"/>
+        </a:xfrm>
+      </p:grpSpPr>
       <p:sp>
         <p:nvSpPr>
           <p:cNvPr id="2" name="标题 1"/>
@@ -2710,12 +2718,12 @@
         <p:spPr/>
         <p:txBody>
           <a:bodyPr/>
+          <a:lstStyle/>
           <a:p>
             <a:r>
               <a:rPr lang="zh-CN" altLang="en-US"/>
               <a:t>获取用户需求</a:t>
             </a:r>
-            <a:endParaRPr lang="zh-CN" altLang="en-US"/>
           </a:p>
         </p:txBody>
       </p:sp>
@@ -2723,14 +2731,14 @@
         <p:nvPicPr>
           <p:cNvPr id="9" name="内容占位符 8" descr="捕获"/>
           <p:cNvPicPr>
-            <a:picLocks noChangeAspect="1"/>
+            <a:picLocks noGrp="1" noChangeAspect="1"/>
           </p:cNvPicPr>
           <p:nvPr>
             <p:ph idx="1"/>
           </p:nvPr>
         </p:nvPicPr>
         <p:blipFill>
-          <a:blip r:embed="rId1"/>
+          <a:blip r:embed="rId2"/>
           <a:stretch>
             <a:fillRect/>
           </a:stretch>
@@ -2762,7 +2770,14 @@
         <p:cNvGrpSpPr/>
         <p:nvPr/>
       </p:nvGrpSpPr>
-      <p:grpSpPr/>
+      <p:grpSpPr>
+        <a:xfrm>
+          <a:off x="0" y="0"/>
+          <a:ext cx="0" cy="0"/>
+          <a:chOff x="0" y="0"/>
+          <a:chExt cx="0" cy="0"/>
+        </a:xfrm>
+      </p:grpSpPr>
       <p:sp>
         <p:nvSpPr>
           <p:cNvPr id="2" name="标题 1"/>
@@ -2776,12 +2791,12 @@
         <p:spPr/>
         <p:txBody>
           <a:bodyPr/>
+          <a:lstStyle/>
           <a:p>
             <a:r>
               <a:rPr lang="zh-CN" altLang="en-US"/>
               <a:t>竞争性需求分析的框架</a:t>
             </a:r>
-            <a:endParaRPr lang="zh-CN" altLang="en-US"/>
           </a:p>
         </p:txBody>
       </p:sp>
@@ -2798,54 +2813,48 @@
         <p:spPr/>
         <p:txBody>
           <a:bodyPr/>
+          <a:lstStyle/>
           <a:p>
             <a:r>
               <a:rPr lang="zh-CN" altLang="en-US"/>
               <a:t>要在竞争性的环境中实践软件工程，要做实用并且创新的项目</a:t>
             </a:r>
-            <a:endParaRPr lang="zh-CN" altLang="en-US"/>
           </a:p>
           <a:p>
             <a:r>
               <a:rPr lang="zh-CN" altLang="en-US"/>
               <a:t>怎么提出创新的想法，怎么说服别人我的创意是靠谱的</a:t>
             </a:r>
-            <a:endParaRPr lang="zh-CN" altLang="en-US"/>
           </a:p>
           <a:p>
             <a:r>
               <a:rPr lang="zh-CN" altLang="en-US"/>
               <a:t>N（Need，需求）</a:t>
             </a:r>
-            <a:endParaRPr lang="zh-CN" altLang="en-US"/>
           </a:p>
           <a:p>
             <a:r>
               <a:rPr lang="zh-CN" altLang="en-US"/>
               <a:t>A（Approach，做法）</a:t>
             </a:r>
-            <a:endParaRPr lang="zh-CN" altLang="en-US"/>
           </a:p>
           <a:p>
             <a:r>
               <a:rPr lang="zh-CN" altLang="en-US"/>
               <a:t>B（Benefit，好处）</a:t>
             </a:r>
-            <a:endParaRPr lang="zh-CN" altLang="en-US"/>
           </a:p>
           <a:p>
             <a:r>
               <a:rPr lang="zh-CN" altLang="en-US"/>
               <a:t>C（Competitors，竞争）</a:t>
             </a:r>
-            <a:endParaRPr lang="zh-CN" altLang="en-US"/>
           </a:p>
           <a:p>
             <a:r>
               <a:rPr lang="zh-CN" altLang="en-US"/>
               <a:t>D（Delivery，推广）</a:t>
             </a:r>
-            <a:endParaRPr lang="zh-CN" altLang="en-US"/>
           </a:p>
         </p:txBody>
       </p:sp>
@@ -2866,7 +2875,14 @@
         <p:cNvGrpSpPr/>
         <p:nvPr/>
       </p:nvGrpSpPr>
-      <p:grpSpPr/>
+      <p:grpSpPr>
+        <a:xfrm>
+          <a:off x="0" y="0"/>
+          <a:ext cx="0" cy="0"/>
+          <a:chOff x="0" y="0"/>
+          <a:chExt cx="0" cy="0"/>
+        </a:xfrm>
+      </p:grpSpPr>
       <p:sp>
         <p:nvSpPr>
           <p:cNvPr id="2" name="标题 1"/>
@@ -2880,12 +2896,12 @@
         <p:spPr/>
         <p:txBody>
           <a:bodyPr/>
+          <a:lstStyle/>
           <a:p>
             <a:r>
               <a:rPr lang="zh-CN" altLang="en-US"/>
               <a:t>功能的定位和优先级</a:t>
             </a:r>
-            <a:endParaRPr lang="zh-CN" altLang="en-US"/>
           </a:p>
         </p:txBody>
       </p:sp>
@@ -2902,12 +2918,12 @@
         <p:spPr/>
         <p:txBody>
           <a:bodyPr/>
+          <a:lstStyle/>
           <a:p>
             <a:r>
               <a:rPr lang="zh-CN" altLang="en-US"/>
               <a:t>一个团队的资源毕竟有限，怎样才能保证我们的投入能得到较大的回报呢</a:t>
             </a:r>
-            <a:endParaRPr lang="zh-CN" altLang="en-US"/>
           </a:p>
           <a:p>
             <a:endParaRPr lang="zh-CN" altLang="en-US"/>
@@ -2923,7 +2939,7 @@
           <p:nvPr/>
         </p:nvPicPr>
         <p:blipFill>
-          <a:blip r:embed="rId1"/>
+          <a:blip r:embed="rId2"/>
           <a:stretch>
             <a:fillRect/>
           </a:stretch>
@@ -2946,6 +2962,1068 @@
 </p:sld>
 </file>
 
+<file path=ppt/slides/slide13.xml><?xml version="1.0" encoding="utf-8"?>
+<p:sld xmlns:a="http://schemas.openxmlformats.org/drawingml/2006/main" xmlns:r="http://schemas.openxmlformats.org/officeDocument/2006/relationships" xmlns:p="http://schemas.openxmlformats.org/presentationml/2006/main">
+  <p:cSld>
+    <p:spTree>
+      <p:nvGrpSpPr>
+        <p:cNvPr id="1" name=""/>
+        <p:cNvGrpSpPr/>
+        <p:nvPr/>
+      </p:nvGrpSpPr>
+      <p:grpSpPr>
+        <a:xfrm>
+          <a:off x="0" y="0"/>
+          <a:ext cx="0" cy="0"/>
+          <a:chOff x="0" y="0"/>
+          <a:chExt cx="0" cy="0"/>
+        </a:xfrm>
+      </p:grpSpPr>
+      <p:sp>
+        <p:nvSpPr>
+          <p:cNvPr id="2" name="标题 1"/>
+          <p:cNvSpPr>
+            <a:spLocks noGrp="1"/>
+          </p:cNvSpPr>
+          <p:nvPr>
+            <p:ph type="title"/>
+          </p:nvPr>
+        </p:nvSpPr>
+        <p:spPr/>
+        <p:txBody>
+          <a:bodyPr/>
+          <a:lstStyle/>
+          <a:p>
+            <a:r>
+              <a:rPr lang="zh-CN" altLang="en-US" dirty="0"/>
+              <a:t>计划和估计</a:t>
+            </a:r>
+          </a:p>
+        </p:txBody>
+      </p:sp>
+      <p:sp>
+        <p:nvSpPr>
+          <p:cNvPr id="3" name="内容占位符 2"/>
+          <p:cNvSpPr>
+            <a:spLocks noGrp="1"/>
+          </p:cNvSpPr>
+          <p:nvPr>
+            <p:ph idx="1"/>
+          </p:nvPr>
+        </p:nvSpPr>
+        <p:spPr/>
+        <p:txBody>
+          <a:bodyPr/>
+          <a:lstStyle/>
+          <a:p>
+            <a:pPr marL="0" indent="0">
+              <a:buNone/>
+            </a:pPr>
+            <a:r>
+              <a:rPr lang="zh-CN" altLang="en-US" dirty="0"/>
+              <a:t>软件项目计划的一个重要环节就是估计</a:t>
+            </a:r>
+            <a:r>
+              <a:rPr lang="zh-CN" altLang="en-US" dirty="0" smtClean="0"/>
+              <a:t>项目各</a:t>
+            </a:r>
+            <a:r>
+              <a:rPr lang="zh-CN" altLang="en-US" dirty="0"/>
+              <a:t>类工作（特别是各种功能）所需的</a:t>
+            </a:r>
+            <a:r>
+              <a:rPr lang="zh-CN" altLang="en-US" dirty="0" smtClean="0"/>
+              <a:t>时间。在</a:t>
+            </a:r>
+            <a:r>
+              <a:rPr lang="zh-CN" altLang="en-US" dirty="0"/>
+              <a:t>开始</a:t>
+            </a:r>
+            <a:r>
+              <a:rPr lang="zh-CN" altLang="en-US" dirty="0" smtClean="0"/>
+              <a:t>估计</a:t>
+            </a:r>
+            <a:r>
+              <a:rPr lang="zh-CN" altLang="en-US" dirty="0"/>
+              <a:t>之前，我们先分清楚几个概念：目标、估计</a:t>
+            </a:r>
+            <a:r>
+              <a:rPr lang="zh-CN" altLang="en-US" dirty="0" smtClean="0"/>
+              <a:t>和决心</a:t>
+            </a:r>
+            <a:endParaRPr lang="zh-CN" altLang="en-US" dirty="0"/>
+          </a:p>
+          <a:p>
+            <a:r>
+              <a:rPr lang="zh-CN" altLang="en-US" dirty="0" smtClean="0"/>
+              <a:t>目标</a:t>
+            </a:r>
+            <a:r>
+              <a:rPr lang="zh-CN" altLang="en-US" dirty="0"/>
+              <a:t>：表明一个希望达到的</a:t>
+            </a:r>
+            <a:r>
+              <a:rPr lang="zh-CN" altLang="en-US" dirty="0" smtClean="0"/>
+              <a:t>状态</a:t>
+            </a:r>
+            <a:endParaRPr lang="en-US" altLang="zh-CN" dirty="0" smtClean="0"/>
+          </a:p>
+          <a:p>
+            <a:r>
+              <a:rPr lang="zh-CN" altLang="en-US" dirty="0"/>
+              <a:t>估计：以当前了解的情况和掌握的资源，要</a:t>
+            </a:r>
+            <a:r>
+              <a:rPr lang="zh-CN" altLang="en-US" dirty="0" smtClean="0"/>
+              <a:t>花费多少</a:t>
+            </a:r>
+            <a:r>
+              <a:rPr lang="zh-CN" altLang="en-US" dirty="0"/>
+              <a:t>人力物力</a:t>
+            </a:r>
+            <a:r>
+              <a:rPr lang="zh-CN" altLang="en-US" dirty="0" smtClean="0"/>
+              <a:t>时       间</a:t>
+            </a:r>
+            <a:r>
+              <a:rPr lang="zh-CN" altLang="en-US" dirty="0"/>
+              <a:t>才能实现某</a:t>
+            </a:r>
+            <a:r>
+              <a:rPr lang="zh-CN" altLang="en-US" dirty="0" smtClean="0"/>
+              <a:t>事</a:t>
+            </a:r>
+            <a:endParaRPr lang="en-US" altLang="zh-CN" dirty="0" smtClean="0"/>
+          </a:p>
+          <a:p>
+            <a:r>
+              <a:rPr lang="zh-CN" altLang="en-US" dirty="0"/>
+              <a:t>决心：保证在某个时间之前完成预先规定的</a:t>
+            </a:r>
+            <a:r>
+              <a:rPr lang="zh-CN" altLang="en-US" dirty="0" smtClean="0"/>
+              <a:t>功能和质量</a:t>
+            </a:r>
+            <a:endParaRPr lang="zh-CN" altLang="en-US" dirty="0"/>
+          </a:p>
+        </p:txBody>
+      </p:sp>
+    </p:spTree>
+    <p:extLst>
+      <p:ext uri="{BB962C8B-B14F-4D97-AF65-F5344CB8AC3E}">
+        <p14:creationId xmlns:p14="http://schemas.microsoft.com/office/powerpoint/2010/main" val="2634761341"/>
+      </p:ext>
+    </p:extLst>
+  </p:cSld>
+  <p:clrMapOvr>
+    <a:masterClrMapping/>
+  </p:clrMapOvr>
+</p:sld>
+</file>
+
+<file path=ppt/slides/slide14.xml><?xml version="1.0" encoding="utf-8"?>
+<p:sld xmlns:a="http://schemas.openxmlformats.org/drawingml/2006/main" xmlns:r="http://schemas.openxmlformats.org/officeDocument/2006/relationships" xmlns:p="http://schemas.openxmlformats.org/presentationml/2006/main">
+  <p:cSld>
+    <p:spTree>
+      <p:nvGrpSpPr>
+        <p:cNvPr id="1" name=""/>
+        <p:cNvGrpSpPr/>
+        <p:nvPr/>
+      </p:nvGrpSpPr>
+      <p:grpSpPr>
+        <a:xfrm>
+          <a:off x="0" y="0"/>
+          <a:ext cx="0" cy="0"/>
+          <a:chOff x="0" y="0"/>
+          <a:chExt cx="0" cy="0"/>
+        </a:xfrm>
+      </p:grpSpPr>
+      <p:sp>
+        <p:nvSpPr>
+          <p:cNvPr id="2" name="标题 1"/>
+          <p:cNvSpPr>
+            <a:spLocks noGrp="1"/>
+          </p:cNvSpPr>
+          <p:nvPr>
+            <p:ph type="title"/>
+          </p:nvPr>
+        </p:nvSpPr>
+        <p:spPr/>
+        <p:txBody>
+          <a:bodyPr/>
+          <a:lstStyle/>
+          <a:p>
+            <a:r>
+              <a:rPr lang="zh-CN" altLang="en-US" dirty="0"/>
+              <a:t>估计后面的假设</a:t>
+            </a:r>
+          </a:p>
+        </p:txBody>
+      </p:sp>
+      <p:sp>
+        <p:nvSpPr>
+          <p:cNvPr id="3" name="内容占位符 2"/>
+          <p:cNvSpPr>
+            <a:spLocks noGrp="1"/>
+          </p:cNvSpPr>
+          <p:nvPr>
+            <p:ph idx="1"/>
+          </p:nvPr>
+        </p:nvSpPr>
+        <p:spPr/>
+        <p:txBody>
+          <a:bodyPr/>
+          <a:lstStyle/>
+          <a:p>
+            <a:r>
+              <a:rPr lang="zh-CN" altLang="en-US" dirty="0"/>
+              <a:t>找到一个</a:t>
+            </a:r>
+            <a:r>
+              <a:rPr lang="zh-CN" altLang="en-US" dirty="0" smtClean="0"/>
+              <a:t>主持人</a:t>
+            </a:r>
+            <a:endParaRPr lang="en-US" altLang="zh-CN" dirty="0" smtClean="0"/>
+          </a:p>
+          <a:p>
+            <a:r>
+              <a:rPr lang="zh-CN" altLang="en-US" dirty="0"/>
+              <a:t>主持几轮讨论，先确定大家对目标有统一的</a:t>
+            </a:r>
+            <a:r>
+              <a:rPr lang="zh-CN" altLang="en-US" dirty="0" smtClean="0"/>
+              <a:t>理解。然后</a:t>
+            </a:r>
+            <a:r>
+              <a:rPr lang="zh-CN" altLang="en-US" dirty="0"/>
+              <a:t>每一轮统计</a:t>
+            </a:r>
+            <a:r>
+              <a:rPr lang="zh-CN" altLang="en-US" dirty="0" smtClean="0"/>
+              <a:t>大家</a:t>
+            </a:r>
+            <a:r>
+              <a:rPr lang="zh-CN" altLang="en-US" dirty="0"/>
+              <a:t>对时间的估计，并且询问大家估计值的前提</a:t>
+            </a:r>
+            <a:r>
+              <a:rPr lang="zh-CN" altLang="en-US" dirty="0" smtClean="0"/>
+              <a:t>假设</a:t>
+            </a:r>
+            <a:r>
+              <a:rPr lang="zh-CN" altLang="en-US" dirty="0"/>
+              <a:t>是什么，</a:t>
+            </a:r>
+            <a:r>
+              <a:rPr lang="zh-CN" altLang="en-US" dirty="0" smtClean="0"/>
+              <a:t>找到</a:t>
+            </a:r>
+            <a:r>
+              <a:rPr lang="zh-CN" altLang="en-US" dirty="0"/>
+              <a:t>合理的假设，然后</a:t>
+            </a:r>
+            <a:r>
+              <a:rPr lang="zh-CN" altLang="en-US" dirty="0" smtClean="0"/>
+              <a:t>继续</a:t>
+            </a:r>
+            <a:endParaRPr lang="en-US" altLang="zh-CN" dirty="0" smtClean="0"/>
+          </a:p>
+          <a:p>
+            <a:r>
+              <a:rPr lang="zh-CN" altLang="en-US" dirty="0"/>
+              <a:t>最后大家的估计收敛到一个大家都</a:t>
+            </a:r>
+            <a:r>
+              <a:rPr lang="zh-CN" altLang="en-US" dirty="0" smtClean="0"/>
+              <a:t>比较满意</a:t>
+            </a:r>
+            <a:r>
+              <a:rPr lang="zh-CN" altLang="en-US" dirty="0"/>
+              <a:t>的精度数值。于是估计就结束</a:t>
+            </a:r>
+            <a:r>
+              <a:rPr lang="zh-CN" altLang="en-US" dirty="0" smtClean="0"/>
+              <a:t>了</a:t>
+            </a:r>
+            <a:endParaRPr lang="zh-CN" altLang="en-US" dirty="0"/>
+          </a:p>
+        </p:txBody>
+      </p:sp>
+    </p:spTree>
+    <p:extLst>
+      <p:ext uri="{BB962C8B-B14F-4D97-AF65-F5344CB8AC3E}">
+        <p14:creationId xmlns:p14="http://schemas.microsoft.com/office/powerpoint/2010/main" val="1012849926"/>
+      </p:ext>
+    </p:extLst>
+  </p:cSld>
+  <p:clrMapOvr>
+    <a:masterClrMapping/>
+  </p:clrMapOvr>
+</p:sld>
+</file>
+
+<file path=ppt/slides/slide15.xml><?xml version="1.0" encoding="utf-8"?>
+<p:sld xmlns:a="http://schemas.openxmlformats.org/drawingml/2006/main" xmlns:r="http://schemas.openxmlformats.org/officeDocument/2006/relationships" xmlns:p="http://schemas.openxmlformats.org/presentationml/2006/main">
+  <p:cSld>
+    <p:spTree>
+      <p:nvGrpSpPr>
+        <p:cNvPr id="1" name=""/>
+        <p:cNvGrpSpPr/>
+        <p:nvPr/>
+      </p:nvGrpSpPr>
+      <p:grpSpPr>
+        <a:xfrm>
+          <a:off x="0" y="0"/>
+          <a:ext cx="0" cy="0"/>
+          <a:chOff x="0" y="0"/>
+          <a:chExt cx="0" cy="0"/>
+        </a:xfrm>
+      </p:grpSpPr>
+      <p:sp>
+        <p:nvSpPr>
+          <p:cNvPr id="4" name="内容占位符 3"/>
+          <p:cNvSpPr>
+            <a:spLocks noGrp="1"/>
+          </p:cNvSpPr>
+          <p:nvPr>
+            <p:ph/>
+          </p:nvPr>
+        </p:nvSpPr>
+        <p:spPr/>
+        <p:txBody>
+          <a:bodyPr/>
+          <a:lstStyle/>
+          <a:p>
+            <a:r>
+              <a:rPr lang="zh-CN" altLang="en-US" dirty="0"/>
+              <a:t>不必太拘泥于</a:t>
+            </a:r>
+            <a:r>
+              <a:rPr lang="zh-CN" altLang="en-US" dirty="0" smtClean="0"/>
+              <a:t>精度</a:t>
+            </a:r>
+            <a:endParaRPr lang="en-US" altLang="zh-CN" dirty="0" smtClean="0"/>
+          </a:p>
+          <a:p>
+            <a:r>
+              <a:rPr lang="zh-CN" altLang="en-US" dirty="0"/>
+              <a:t>主持人要记住在每一轮的讨论中探询</a:t>
+            </a:r>
+            <a:r>
+              <a:rPr lang="zh-CN" altLang="en-US" dirty="0" smtClean="0"/>
+              <a:t>数值</a:t>
+            </a:r>
+            <a:r>
+              <a:rPr lang="zh-CN" altLang="en-US" dirty="0"/>
+              <a:t>背后的</a:t>
+            </a:r>
+            <a:r>
+              <a:rPr lang="zh-CN" altLang="en-US" dirty="0" smtClean="0"/>
+              <a:t>假设</a:t>
+            </a:r>
+            <a:endParaRPr lang="en-US" altLang="zh-CN" dirty="0" smtClean="0"/>
+          </a:p>
+          <a:p>
+            <a:r>
+              <a:rPr lang="zh-CN" altLang="en-US" dirty="0"/>
+              <a:t>大家的</a:t>
+            </a:r>
+            <a:r>
+              <a:rPr lang="zh-CN" altLang="en-US" dirty="0" smtClean="0"/>
+              <a:t>假设要</a:t>
+            </a:r>
+            <a:r>
+              <a:rPr lang="zh-CN" altLang="en-US" dirty="0"/>
+              <a:t>收敛，不要</a:t>
+            </a:r>
+            <a:r>
+              <a:rPr lang="zh-CN" altLang="en-US" dirty="0" smtClean="0"/>
+              <a:t>天马行空，</a:t>
+            </a:r>
+            <a:r>
+              <a:rPr lang="zh-CN" altLang="en-US" dirty="0"/>
+              <a:t>每一轮的讨论中，估计值的上界和下界</a:t>
+            </a:r>
+            <a:r>
+              <a:rPr lang="zh-CN" altLang="en-US" dirty="0" smtClean="0"/>
+              <a:t>要不断</a:t>
+            </a:r>
+            <a:r>
+              <a:rPr lang="zh-CN" altLang="en-US" dirty="0"/>
+              <a:t>接近</a:t>
+            </a:r>
+          </a:p>
+          <a:p>
+            <a:r>
+              <a:rPr lang="zh-CN" altLang="en-US" dirty="0"/>
+              <a:t>最后得到的估计数值，也许</a:t>
+            </a:r>
+            <a:r>
+              <a:rPr lang="zh-CN" altLang="en-US" dirty="0" smtClean="0"/>
+              <a:t>和某人</a:t>
+            </a:r>
+            <a:r>
+              <a:rPr lang="zh-CN" altLang="en-US" dirty="0"/>
+              <a:t>最初提出的数值很接近，但是这意义</a:t>
+            </a:r>
+            <a:r>
+              <a:rPr lang="zh-CN" altLang="en-US" dirty="0" smtClean="0"/>
+              <a:t>并不大</a:t>
+            </a:r>
+            <a:endParaRPr lang="zh-CN" altLang="en-US" dirty="0"/>
+          </a:p>
+          <a:p>
+            <a:r>
+              <a:rPr lang="zh-CN" altLang="en-US" dirty="0" smtClean="0"/>
+              <a:t>长期项目要考虑人员变动问题</a:t>
+            </a:r>
+            <a:endParaRPr lang="en-US" altLang="zh-CN" dirty="0" smtClean="0"/>
+          </a:p>
+          <a:p>
+            <a:r>
+              <a:rPr lang="zh-CN" altLang="en-US" dirty="0"/>
+              <a:t>软件</a:t>
+            </a:r>
+            <a:r>
+              <a:rPr lang="zh-CN" altLang="en-US" dirty="0" smtClean="0"/>
+              <a:t>项目有不少</a:t>
+            </a:r>
+            <a:r>
+              <a:rPr lang="zh-CN" altLang="en-US" dirty="0"/>
+              <a:t>东西可以重用别人的结果，但是项目中最</a:t>
+            </a:r>
+            <a:r>
+              <a:rPr lang="zh-CN" altLang="en-US" dirty="0" smtClean="0"/>
+              <a:t>有价值</a:t>
+            </a:r>
+            <a:r>
+              <a:rPr lang="zh-CN" altLang="en-US" dirty="0"/>
+              <a:t>的部分，别人都还没做过</a:t>
+            </a:r>
+            <a:r>
+              <a:rPr lang="zh-CN" altLang="en-US" dirty="0" smtClean="0"/>
+              <a:t>，得</a:t>
+            </a:r>
+            <a:r>
+              <a:rPr lang="zh-CN" altLang="en-US" dirty="0"/>
+              <a:t>自己</a:t>
+            </a:r>
+            <a:r>
+              <a:rPr lang="zh-CN" altLang="en-US" dirty="0" smtClean="0"/>
+              <a:t>动手，这时不能</a:t>
+            </a:r>
+            <a:r>
+              <a:rPr lang="zh-CN" altLang="en-US" dirty="0"/>
+              <a:t>高估自己的</a:t>
+            </a:r>
+            <a:r>
+              <a:rPr lang="zh-CN" altLang="en-US" dirty="0" smtClean="0"/>
+              <a:t>能力</a:t>
+            </a:r>
+            <a:r>
+              <a:rPr lang="zh-CN" altLang="en-US" dirty="0"/>
+              <a:t>，低估未知的困难</a:t>
+            </a:r>
+          </a:p>
+          <a:p>
+            <a:endParaRPr lang="zh-CN" altLang="en-US" dirty="0"/>
+          </a:p>
+          <a:p>
+            <a:endParaRPr lang="en-US" altLang="zh-CN" dirty="0" smtClean="0"/>
+          </a:p>
+          <a:p>
+            <a:endParaRPr lang="zh-CN" altLang="en-US" dirty="0"/>
+          </a:p>
+          <a:p>
+            <a:endParaRPr lang="zh-CN" altLang="en-US" dirty="0"/>
+          </a:p>
+          <a:p>
+            <a:endParaRPr lang="zh-CN" altLang="en-US" dirty="0"/>
+          </a:p>
+        </p:txBody>
+      </p:sp>
+    </p:spTree>
+    <p:extLst>
+      <p:ext uri="{BB962C8B-B14F-4D97-AF65-F5344CB8AC3E}">
+        <p14:creationId xmlns:p14="http://schemas.microsoft.com/office/powerpoint/2010/main" val="1894574621"/>
+      </p:ext>
+    </p:extLst>
+  </p:cSld>
+  <p:clrMapOvr>
+    <a:masterClrMapping/>
+  </p:clrMapOvr>
+</p:sld>
+</file>
+
+<file path=ppt/slides/slide16.xml><?xml version="1.0" encoding="utf-8"?>
+<p:sld xmlns:a="http://schemas.openxmlformats.org/drawingml/2006/main" xmlns:r="http://schemas.openxmlformats.org/officeDocument/2006/relationships" xmlns:p="http://schemas.openxmlformats.org/presentationml/2006/main">
+  <p:cSld>
+    <p:spTree>
+      <p:nvGrpSpPr>
+        <p:cNvPr id="1" name=""/>
+        <p:cNvGrpSpPr/>
+        <p:nvPr/>
+      </p:nvGrpSpPr>
+      <p:grpSpPr>
+        <a:xfrm>
+          <a:off x="0" y="0"/>
+          <a:ext cx="0" cy="0"/>
+          <a:chOff x="0" y="0"/>
+          <a:chExt cx="0" cy="0"/>
+        </a:xfrm>
+      </p:grpSpPr>
+      <p:sp>
+        <p:nvSpPr>
+          <p:cNvPr id="2" name="内容占位符 1"/>
+          <p:cNvSpPr>
+            <a:spLocks noGrp="1"/>
+          </p:cNvSpPr>
+          <p:nvPr>
+            <p:ph/>
+          </p:nvPr>
+        </p:nvSpPr>
+        <p:spPr/>
+        <p:txBody>
+          <a:bodyPr/>
+          <a:lstStyle/>
+          <a:p>
+            <a:r>
+              <a:rPr lang="zh-CN" altLang="en-US" dirty="0"/>
+              <a:t>实际时间花费主要取决于两</a:t>
+            </a:r>
+            <a:r>
+              <a:rPr lang="zh-CN" altLang="en-US" dirty="0" smtClean="0"/>
+              <a:t>个因素</a:t>
+            </a:r>
+            <a:r>
+              <a:rPr lang="en-US" altLang="zh-CN" dirty="0" smtClean="0"/>
+              <a:t>—</a:t>
+            </a:r>
+            <a:r>
+              <a:rPr lang="zh-CN" altLang="en-US" dirty="0" smtClean="0"/>
+              <a:t>对</a:t>
+            </a:r>
+            <a:r>
+              <a:rPr lang="zh-CN" altLang="en-US" dirty="0"/>
+              <a:t>某件事的估计</a:t>
+            </a:r>
+            <a:r>
+              <a:rPr lang="zh-CN" altLang="en-US" dirty="0" smtClean="0"/>
+              <a:t>时间</a:t>
+            </a:r>
+            <a:r>
+              <a:rPr lang="en-US" altLang="zh-CN" dirty="0" smtClean="0"/>
+              <a:t>X</a:t>
+            </a:r>
+            <a:r>
+              <a:rPr lang="zh-CN" altLang="en-US" dirty="0" smtClean="0"/>
+              <a:t>，</a:t>
+            </a:r>
+            <a:r>
+              <a:rPr lang="zh-CN" altLang="en-US" dirty="0"/>
+              <a:t>以及他做过</a:t>
+            </a:r>
+            <a:r>
+              <a:rPr lang="zh-CN" altLang="en-US" dirty="0" smtClean="0"/>
+              <a:t>类似开发</a:t>
+            </a:r>
+            <a:r>
+              <a:rPr lang="zh-CN" altLang="en-US" dirty="0"/>
+              <a:t>工作的</a:t>
+            </a:r>
+            <a:r>
+              <a:rPr lang="zh-CN" altLang="en-US" dirty="0" smtClean="0"/>
+              <a:t>次数</a:t>
+            </a:r>
+            <a:r>
+              <a:rPr lang="en-US" altLang="zh-CN" dirty="0" smtClean="0"/>
+              <a:t>N</a:t>
+            </a:r>
+            <a:r>
+              <a:rPr lang="zh-CN" altLang="en-US" dirty="0" smtClean="0"/>
+              <a:t>：</a:t>
+            </a:r>
+            <a:r>
+              <a:rPr lang="en-US" altLang="zh-CN" dirty="0"/>
+              <a:t>Y = X ± X ÷ </a:t>
+            </a:r>
+            <a:r>
+              <a:rPr lang="en-US" altLang="zh-CN" dirty="0" smtClean="0"/>
+              <a:t>N</a:t>
+            </a:r>
+          </a:p>
+          <a:p>
+            <a:r>
+              <a:rPr lang="zh-CN" altLang="en-US" dirty="0"/>
+              <a:t>项目的</a:t>
+            </a:r>
+            <a:r>
+              <a:rPr lang="zh-CN" altLang="en-US" dirty="0" smtClean="0"/>
+              <a:t>复杂程度</a:t>
+            </a:r>
+            <a:r>
+              <a:rPr lang="zh-CN" altLang="en-US" dirty="0"/>
+              <a:t>将由下面两个因素决定：</a:t>
+            </a:r>
+          </a:p>
+          <a:p>
+            <a:r>
+              <a:rPr lang="zh-CN" altLang="en-US" dirty="0"/>
+              <a:t>需求的复杂程度：程序员是第几次实现类似</a:t>
+            </a:r>
+            <a:r>
+              <a:rPr lang="zh-CN" altLang="en-US" dirty="0" smtClean="0"/>
+              <a:t>的需求</a:t>
+            </a:r>
+            <a:endParaRPr lang="zh-CN" altLang="en-US" dirty="0"/>
+          </a:p>
+          <a:p>
+            <a:r>
+              <a:rPr lang="zh-CN" altLang="en-US" dirty="0"/>
+              <a:t>技术的复杂程度：程序员是第几次用这个</a:t>
+            </a:r>
+            <a:r>
+              <a:rPr lang="zh-CN" altLang="en-US" dirty="0" smtClean="0"/>
+              <a:t>技术实现</a:t>
+            </a:r>
+            <a:endParaRPr lang="en-US" altLang="zh-CN" dirty="0" smtClean="0"/>
+          </a:p>
+          <a:p>
+            <a:endParaRPr lang="zh-CN" altLang="en-US" dirty="0"/>
+          </a:p>
+          <a:p>
+            <a:pPr marL="0" indent="0">
+              <a:buNone/>
+            </a:pPr>
+            <a:endParaRPr lang="zh-CN" altLang="en-US" dirty="0"/>
+          </a:p>
+        </p:txBody>
+      </p:sp>
+      <p:pic>
+        <p:nvPicPr>
+          <p:cNvPr id="3" name="图片 2"/>
+          <p:cNvPicPr>
+            <a:picLocks noChangeAspect="1"/>
+          </p:cNvPicPr>
+          <p:nvPr/>
+        </p:nvPicPr>
+        <p:blipFill>
+          <a:blip r:embed="rId2">
+            <a:extLst>
+              <a:ext uri="{28A0092B-C50C-407E-A947-70E740481C1C}">
+                <a14:useLocalDpi xmlns:a14="http://schemas.microsoft.com/office/drawing/2010/main" val="0"/>
+              </a:ext>
+            </a:extLst>
+          </a:blip>
+          <a:stretch>
+            <a:fillRect/>
+          </a:stretch>
+        </p:blipFill>
+        <p:spPr>
+          <a:xfrm>
+            <a:off x="2323651" y="2844845"/>
+            <a:ext cx="4174003" cy="3451580"/>
+          </a:xfrm>
+          <a:prstGeom prst="rect">
+            <a:avLst/>
+          </a:prstGeom>
+        </p:spPr>
+      </p:pic>
+    </p:spTree>
+    <p:extLst>
+      <p:ext uri="{BB962C8B-B14F-4D97-AF65-F5344CB8AC3E}">
+        <p14:creationId xmlns:p14="http://schemas.microsoft.com/office/powerpoint/2010/main" val="2307718755"/>
+      </p:ext>
+    </p:extLst>
+  </p:cSld>
+  <p:clrMapOvr>
+    <a:masterClrMapping/>
+  </p:clrMapOvr>
+</p:sld>
+</file>
+
+<file path=ppt/slides/slide17.xml><?xml version="1.0" encoding="utf-8"?>
+<p:sld xmlns:a="http://schemas.openxmlformats.org/drawingml/2006/main" xmlns:r="http://schemas.openxmlformats.org/officeDocument/2006/relationships" xmlns:p="http://schemas.openxmlformats.org/presentationml/2006/main">
+  <p:cSld>
+    <p:spTree>
+      <p:nvGrpSpPr>
+        <p:cNvPr id="1" name=""/>
+        <p:cNvGrpSpPr/>
+        <p:nvPr/>
+      </p:nvGrpSpPr>
+      <p:grpSpPr>
+        <a:xfrm>
+          <a:off x="0" y="0"/>
+          <a:ext cx="0" cy="0"/>
+          <a:chOff x="0" y="0"/>
+          <a:chExt cx="0" cy="0"/>
+        </a:xfrm>
+      </p:grpSpPr>
+      <p:sp>
+        <p:nvSpPr>
+          <p:cNvPr id="3" name="标题 2"/>
+          <p:cNvSpPr>
+            <a:spLocks noGrp="1"/>
+          </p:cNvSpPr>
+          <p:nvPr>
+            <p:ph type="title"/>
+          </p:nvPr>
+        </p:nvSpPr>
+        <p:spPr/>
+        <p:txBody>
+          <a:bodyPr/>
+          <a:lstStyle/>
+          <a:p>
+            <a:r>
+              <a:rPr lang="zh-CN" altLang="en-US" dirty="0" smtClean="0"/>
+              <a:t>时间估计的两</a:t>
+            </a:r>
+            <a:r>
+              <a:rPr lang="zh-CN" altLang="en-US" dirty="0"/>
+              <a:t>个方面</a:t>
+            </a:r>
+          </a:p>
+        </p:txBody>
+      </p:sp>
+      <p:sp>
+        <p:nvSpPr>
+          <p:cNvPr id="4" name="内容占位符 3"/>
+          <p:cNvSpPr>
+            <a:spLocks noGrp="1"/>
+          </p:cNvSpPr>
+          <p:nvPr>
+            <p:ph idx="1"/>
+          </p:nvPr>
+        </p:nvSpPr>
+        <p:spPr/>
+        <p:txBody>
+          <a:bodyPr/>
+          <a:lstStyle/>
+          <a:p>
+            <a:r>
+              <a:rPr lang="zh-CN" altLang="en-US" dirty="0"/>
+              <a:t>自底向上。团队成员各自估计底层模块和</a:t>
+            </a:r>
+            <a:r>
+              <a:rPr lang="zh-CN" altLang="en-US" dirty="0" smtClean="0"/>
+              <a:t>单个功能</a:t>
+            </a:r>
+            <a:r>
+              <a:rPr lang="zh-CN" altLang="en-US" dirty="0"/>
+              <a:t>（及单元测试）所需的时间，再加上集成</a:t>
+            </a:r>
+            <a:r>
+              <a:rPr lang="zh-CN" altLang="en-US" dirty="0" smtClean="0"/>
+              <a:t>及基本</a:t>
+            </a:r>
+            <a:r>
+              <a:rPr lang="zh-CN" altLang="en-US" dirty="0"/>
+              <a:t>测试的时间，就是大概的开发</a:t>
+            </a:r>
+            <a:r>
+              <a:rPr lang="zh-CN" altLang="en-US" dirty="0" smtClean="0"/>
+              <a:t>时间</a:t>
+            </a:r>
+            <a:endParaRPr lang="en-US" altLang="zh-CN" dirty="0" smtClean="0"/>
+          </a:p>
+          <a:p>
+            <a:r>
+              <a:rPr lang="zh-CN" altLang="en-US" dirty="0"/>
+              <a:t>回溯。团队从整个项目最终交付之日往回</a:t>
+            </a:r>
+            <a:r>
+              <a:rPr lang="zh-CN" altLang="en-US" dirty="0" smtClean="0"/>
+              <a:t>倒推</a:t>
+            </a:r>
+            <a:endParaRPr lang="zh-CN" altLang="en-US" dirty="0"/>
+          </a:p>
+          <a:p>
+            <a:endParaRPr lang="zh-CN" altLang="en-US" dirty="0"/>
+          </a:p>
+          <a:p>
+            <a:endParaRPr lang="zh-CN" altLang="en-US" dirty="0"/>
+          </a:p>
+        </p:txBody>
+      </p:sp>
+    </p:spTree>
+    <p:extLst>
+      <p:ext uri="{BB962C8B-B14F-4D97-AF65-F5344CB8AC3E}">
+        <p14:creationId xmlns:p14="http://schemas.microsoft.com/office/powerpoint/2010/main" val="3282757872"/>
+      </p:ext>
+    </p:extLst>
+  </p:cSld>
+  <p:clrMapOvr>
+    <a:masterClrMapping/>
+  </p:clrMapOvr>
+</p:sld>
+</file>
+
+<file path=ppt/slides/slide18.xml><?xml version="1.0" encoding="utf-8"?>
+<p:sld xmlns:a="http://schemas.openxmlformats.org/drawingml/2006/main" xmlns:r="http://schemas.openxmlformats.org/officeDocument/2006/relationships" xmlns:p="http://schemas.openxmlformats.org/presentationml/2006/main">
+  <p:cSld>
+    <p:spTree>
+      <p:nvGrpSpPr>
+        <p:cNvPr id="1" name=""/>
+        <p:cNvGrpSpPr/>
+        <p:nvPr/>
+      </p:nvGrpSpPr>
+      <p:grpSpPr>
+        <a:xfrm>
+          <a:off x="0" y="0"/>
+          <a:ext cx="0" cy="0"/>
+          <a:chOff x="0" y="0"/>
+          <a:chExt cx="0" cy="0"/>
+        </a:xfrm>
+      </p:grpSpPr>
+      <p:sp>
+        <p:nvSpPr>
+          <p:cNvPr id="4" name="内容占位符 3"/>
+          <p:cNvSpPr>
+            <a:spLocks noGrp="1"/>
+          </p:cNvSpPr>
+          <p:nvPr>
+            <p:ph/>
+          </p:nvPr>
+        </p:nvSpPr>
+        <p:spPr/>
+        <p:txBody>
+          <a:bodyPr>
+            <a:normAutofit/>
+          </a:bodyPr>
+          <a:lstStyle/>
+          <a:p>
+            <a:endParaRPr lang="en-US" altLang="zh-CN" dirty="0" smtClean="0"/>
+          </a:p>
+          <a:p>
+            <a:endParaRPr lang="en-US" altLang="zh-CN" dirty="0"/>
+          </a:p>
+          <a:p>
+            <a:endParaRPr lang="en-US" altLang="zh-CN" dirty="0" smtClean="0"/>
+          </a:p>
+          <a:p>
+            <a:pPr marL="0" indent="0">
+              <a:buNone/>
+            </a:pPr>
+            <a:r>
+              <a:rPr lang="zh-CN" altLang="en-US" dirty="0" smtClean="0"/>
+              <a:t>在</a:t>
+            </a:r>
+            <a:r>
+              <a:rPr lang="zh-CN" altLang="en-US" dirty="0"/>
+              <a:t>敏捷开发的项目中，团队一般不过分</a:t>
+            </a:r>
+            <a:r>
+              <a:rPr lang="zh-CN" altLang="en-US" dirty="0" smtClean="0"/>
+              <a:t>强调“估计”的</a:t>
+            </a:r>
+            <a:r>
+              <a:rPr lang="zh-CN" altLang="en-US" dirty="0"/>
+              <a:t>价值，因为它就是一</a:t>
+            </a:r>
+            <a:r>
+              <a:rPr lang="zh-CN" altLang="en-US" dirty="0" smtClean="0"/>
+              <a:t>个“猜”字。“猜得准”不是</a:t>
+            </a:r>
+            <a:r>
+              <a:rPr lang="zh-CN" altLang="en-US" dirty="0"/>
+              <a:t>团队的目标。团队的目标是把软件写出来，</a:t>
+            </a:r>
+            <a:r>
+              <a:rPr lang="zh-CN" altLang="en-US" dirty="0" smtClean="0"/>
+              <a:t>让用户</a:t>
+            </a:r>
+            <a:r>
+              <a:rPr lang="zh-CN" altLang="en-US" dirty="0"/>
+              <a:t>满意。如果猜错了，没关系，微调项目</a:t>
+            </a:r>
+            <a:r>
+              <a:rPr lang="zh-CN" altLang="en-US" dirty="0" smtClean="0"/>
+              <a:t>进度即</a:t>
+            </a:r>
+            <a:r>
+              <a:rPr lang="zh-CN" altLang="en-US" dirty="0"/>
+              <a:t>可，不要</a:t>
+            </a:r>
+            <a:r>
+              <a:rPr lang="zh-CN" altLang="en-US" dirty="0" smtClean="0"/>
+              <a:t>为了“猜得准”而</a:t>
+            </a:r>
+            <a:r>
+              <a:rPr lang="zh-CN" altLang="en-US" dirty="0"/>
+              <a:t>踌躇不前，或者</a:t>
+            </a:r>
+            <a:r>
+              <a:rPr lang="zh-CN" altLang="en-US" dirty="0" smtClean="0"/>
+              <a:t>为了让</a:t>
+            </a:r>
+            <a:r>
+              <a:rPr lang="zh-CN" altLang="en-US" dirty="0"/>
+              <a:t>当初的猜测看起来靠谱而不如实报告进度</a:t>
+            </a:r>
+          </a:p>
+          <a:p>
+            <a:pPr marL="0" indent="0">
+              <a:buNone/>
+            </a:pPr>
+            <a:endParaRPr lang="zh-CN" altLang="en-US" dirty="0"/>
+          </a:p>
+        </p:txBody>
+      </p:sp>
+    </p:spTree>
+    <p:extLst>
+      <p:ext uri="{BB962C8B-B14F-4D97-AF65-F5344CB8AC3E}">
+        <p14:creationId xmlns:p14="http://schemas.microsoft.com/office/powerpoint/2010/main" val="1321811906"/>
+      </p:ext>
+    </p:extLst>
+  </p:cSld>
+  <p:clrMapOvr>
+    <a:masterClrMapping/>
+  </p:clrMapOvr>
+</p:sld>
+</file>
+
+<file path=ppt/slides/slide19.xml><?xml version="1.0" encoding="utf-8"?>
+<p:sld xmlns:a="http://schemas.openxmlformats.org/drawingml/2006/main" xmlns:r="http://schemas.openxmlformats.org/officeDocument/2006/relationships" xmlns:p="http://schemas.openxmlformats.org/presentationml/2006/main">
+  <p:cSld>
+    <p:spTree>
+      <p:nvGrpSpPr>
+        <p:cNvPr id="1" name=""/>
+        <p:cNvGrpSpPr/>
+        <p:nvPr/>
+      </p:nvGrpSpPr>
+      <p:grpSpPr>
+        <a:xfrm>
+          <a:off x="0" y="0"/>
+          <a:ext cx="0" cy="0"/>
+          <a:chOff x="0" y="0"/>
+          <a:chExt cx="0" cy="0"/>
+        </a:xfrm>
+      </p:grpSpPr>
+      <p:sp>
+        <p:nvSpPr>
+          <p:cNvPr id="3" name="标题 2"/>
+          <p:cNvSpPr>
+            <a:spLocks noGrp="1"/>
+          </p:cNvSpPr>
+          <p:nvPr>
+            <p:ph type="title"/>
+          </p:nvPr>
+        </p:nvSpPr>
+        <p:spPr/>
+        <p:txBody>
+          <a:bodyPr/>
+          <a:lstStyle/>
+          <a:p>
+            <a:r>
+              <a:rPr lang="zh-CN" altLang="en-US" dirty="0"/>
+              <a:t>分而治之</a:t>
+            </a:r>
+          </a:p>
+        </p:txBody>
+      </p:sp>
+      <p:sp>
+        <p:nvSpPr>
+          <p:cNvPr id="4" name="内容占位符 3"/>
+          <p:cNvSpPr>
+            <a:spLocks noGrp="1"/>
+          </p:cNvSpPr>
+          <p:nvPr>
+            <p:ph idx="1"/>
+          </p:nvPr>
+        </p:nvSpPr>
+        <p:spPr/>
+        <p:txBody>
+          <a:bodyPr/>
+          <a:lstStyle/>
+          <a:p>
+            <a:pPr marL="0" indent="0">
+              <a:buNone/>
+            </a:pPr>
+            <a:r>
+              <a:rPr lang="zh-CN" altLang="en-US" dirty="0"/>
+              <a:t>一个团队项目要在一段时间内完成诸多任务，</a:t>
+            </a:r>
+            <a:r>
+              <a:rPr lang="zh-CN" altLang="en-US" dirty="0" smtClean="0"/>
+              <a:t>满足</a:t>
+            </a:r>
+            <a:r>
+              <a:rPr lang="zh-CN" altLang="en-US" dirty="0"/>
+              <a:t>用户的需求，实现团队的目标，同时还希望</a:t>
+            </a:r>
+            <a:r>
+              <a:rPr lang="zh-CN" altLang="en-US" dirty="0" smtClean="0"/>
+              <a:t>项目</a:t>
+            </a:r>
+            <a:r>
+              <a:rPr lang="zh-CN" altLang="en-US" dirty="0"/>
+              <a:t>能维持良好的技术架构，以便持续开发，</a:t>
+            </a:r>
+            <a:r>
+              <a:rPr lang="zh-CN" altLang="en-US" dirty="0" smtClean="0"/>
+              <a:t>千头万绪</a:t>
+            </a:r>
+            <a:r>
+              <a:rPr lang="zh-CN" altLang="en-US" dirty="0"/>
+              <a:t>，从哪里入手</a:t>
+            </a:r>
+            <a:r>
+              <a:rPr lang="zh-CN" altLang="en-US" dirty="0" smtClean="0"/>
+              <a:t>？</a:t>
+            </a:r>
+            <a:endParaRPr lang="en-US" altLang="zh-CN" dirty="0" smtClean="0"/>
+          </a:p>
+          <a:p>
+            <a:pPr marL="0" indent="0">
+              <a:buNone/>
+            </a:pPr>
+            <a:endParaRPr lang="zh-CN" altLang="en-US" dirty="0"/>
+          </a:p>
+        </p:txBody>
+      </p:sp>
+      <p:pic>
+        <p:nvPicPr>
+          <p:cNvPr id="5" name="图片 4"/>
+          <p:cNvPicPr>
+            <a:picLocks noChangeAspect="1"/>
+          </p:cNvPicPr>
+          <p:nvPr/>
+        </p:nvPicPr>
+        <p:blipFill>
+          <a:blip r:embed="rId2">
+            <a:extLst>
+              <a:ext uri="{28A0092B-C50C-407E-A947-70E740481C1C}">
+                <a14:useLocalDpi xmlns:a14="http://schemas.microsoft.com/office/drawing/2010/main" val="0"/>
+              </a:ext>
+            </a:extLst>
+          </a:blip>
+          <a:stretch>
+            <a:fillRect/>
+          </a:stretch>
+        </p:blipFill>
+        <p:spPr>
+          <a:xfrm>
+            <a:off x="1605369" y="3515060"/>
+            <a:ext cx="7001853" cy="2219635"/>
+          </a:xfrm>
+          <a:prstGeom prst="rect">
+            <a:avLst/>
+          </a:prstGeom>
+        </p:spPr>
+      </p:pic>
+    </p:spTree>
+    <p:extLst>
+      <p:ext uri="{BB962C8B-B14F-4D97-AF65-F5344CB8AC3E}">
+        <p14:creationId xmlns:p14="http://schemas.microsoft.com/office/powerpoint/2010/main" val="3082895364"/>
+      </p:ext>
+    </p:extLst>
+  </p:cSld>
+  <p:clrMapOvr>
+    <a:masterClrMapping/>
+  </p:clrMapOvr>
+</p:sld>
+</file>
+
 <file path=ppt/slides/slide2.xml><?xml version="1.0" encoding="utf-8"?>
 <p:sld xmlns:a="http://schemas.openxmlformats.org/drawingml/2006/main" xmlns:r="http://schemas.openxmlformats.org/officeDocument/2006/relationships" xmlns:p="http://schemas.openxmlformats.org/presentationml/2006/main">
   <p:cSld>
@@ -2955,7 +4033,14 @@
         <p:cNvGrpSpPr/>
         <p:nvPr/>
       </p:nvGrpSpPr>
-      <p:grpSpPr/>
+      <p:grpSpPr>
+        <a:xfrm>
+          <a:off x="0" y="0"/>
+          <a:ext cx="0" cy="0"/>
+          <a:chOff x="0" y="0"/>
+          <a:chExt cx="0" cy="0"/>
+        </a:xfrm>
+      </p:grpSpPr>
       <p:sp>
         <p:nvSpPr>
           <p:cNvPr id="2" name="标题 1"/>
@@ -2969,12 +4054,12 @@
         <p:spPr/>
         <p:txBody>
           <a:bodyPr/>
+          <a:lstStyle/>
           <a:p>
             <a:r>
               <a:rPr lang="zh-CN" altLang="en-US"/>
               <a:t>软件需求</a:t>
             </a:r>
-            <a:endParaRPr lang="zh-CN" altLang="en-US"/>
           </a:p>
         </p:txBody>
       </p:sp>
@@ -2991,6 +4076,7 @@
         <p:spPr/>
         <p:txBody>
           <a:bodyPr/>
+          <a:lstStyle/>
           <a:p>
             <a:pPr marL="0" indent="0">
               <a:buNone/>
@@ -2999,7 +4085,6 @@
               <a:rPr lang="zh-CN" altLang="en-US"/>
               <a:t>人们的需求五花八门，那么软件团队如何才能准确而全面地找到这些需求呢？</a:t>
             </a:r>
-            <a:endParaRPr lang="zh-CN" altLang="en-US"/>
           </a:p>
           <a:p>
             <a:r>
@@ -3010,7 +4095,6 @@
               <a:rPr lang="zh-CN" altLang="en-US"/>
               <a:t>、获取和引导需求</a:t>
             </a:r>
-            <a:endParaRPr lang="zh-CN" altLang="en-US"/>
           </a:p>
           <a:p>
             <a:r>
@@ -3021,7 +4105,6 @@
               <a:rPr lang="zh-CN" altLang="en-US"/>
               <a:t>、分析和定义需求</a:t>
             </a:r>
-            <a:endParaRPr lang="zh-CN" altLang="en-US"/>
           </a:p>
           <a:p>
             <a:r>
@@ -3032,7 +4115,6 @@
               <a:rPr lang="zh-CN" altLang="en-US"/>
               <a:t>、验证需求</a:t>
             </a:r>
-            <a:endParaRPr lang="zh-CN" altLang="en-US"/>
           </a:p>
           <a:p>
             <a:r>
@@ -3043,11 +4125,188 @@
               <a:rPr lang="zh-CN" altLang="en-US"/>
               <a:t>、在软件产品的生命周期中管理需求</a:t>
             </a:r>
-            <a:endParaRPr lang="zh-CN" altLang="en-US"/>
           </a:p>
         </p:txBody>
       </p:sp>
     </p:spTree>
+  </p:cSld>
+  <p:clrMapOvr>
+    <a:masterClrMapping/>
+  </p:clrMapOvr>
+</p:sld>
+</file>
+
+<file path=ppt/slides/slide20.xml><?xml version="1.0" encoding="utf-8"?>
+<p:sld xmlns:a="http://schemas.openxmlformats.org/drawingml/2006/main" xmlns:r="http://schemas.openxmlformats.org/officeDocument/2006/relationships" xmlns:p="http://schemas.openxmlformats.org/presentationml/2006/main">
+  <p:cSld>
+    <p:spTree>
+      <p:nvGrpSpPr>
+        <p:cNvPr id="1" name=""/>
+        <p:cNvGrpSpPr/>
+        <p:nvPr/>
+      </p:nvGrpSpPr>
+      <p:grpSpPr>
+        <a:xfrm>
+          <a:off x="0" y="0"/>
+          <a:ext cx="0" cy="0"/>
+          <a:chOff x="0" y="0"/>
+          <a:chExt cx="0" cy="0"/>
+        </a:xfrm>
+      </p:grpSpPr>
+      <p:sp>
+        <p:nvSpPr>
+          <p:cNvPr id="2" name="标题 1"/>
+          <p:cNvSpPr>
+            <a:spLocks noGrp="1"/>
+          </p:cNvSpPr>
+          <p:nvPr>
+            <p:ph type="title"/>
+          </p:nvPr>
+        </p:nvSpPr>
+        <p:spPr/>
+        <p:txBody>
+          <a:bodyPr/>
+          <a:lstStyle/>
+          <a:p>
+            <a:r>
+              <a:rPr lang="zh-CN" altLang="en-US" dirty="0" smtClean="0"/>
+              <a:t>分而治之</a:t>
+            </a:r>
+            <a:endParaRPr lang="zh-CN" altLang="en-US" dirty="0"/>
+          </a:p>
+        </p:txBody>
+      </p:sp>
+      <p:sp>
+        <p:nvSpPr>
+          <p:cNvPr id="3" name="内容占位符 2"/>
+          <p:cNvSpPr>
+            <a:spLocks noGrp="1"/>
+          </p:cNvSpPr>
+          <p:nvPr>
+            <p:ph idx="1"/>
+          </p:nvPr>
+        </p:nvSpPr>
+        <p:spPr/>
+        <p:txBody>
+          <a:bodyPr>
+            <a:normAutofit/>
+          </a:bodyPr>
+          <a:lstStyle/>
+          <a:p>
+            <a:r>
+              <a:rPr lang="zh-CN" altLang="en-US" dirty="0"/>
+              <a:t>保证所有子节点覆盖了全部父节点包含的</a:t>
+            </a:r>
+            <a:r>
+              <a:rPr lang="zh-CN" altLang="en-US" dirty="0" smtClean="0"/>
+              <a:t>内容</a:t>
+            </a:r>
+            <a:endParaRPr lang="zh-CN" altLang="en-US" dirty="0"/>
+          </a:p>
+          <a:p>
+            <a:r>
+              <a:rPr lang="zh-CN" altLang="en-US" dirty="0"/>
+              <a:t>保证各个子节点不要相互</a:t>
+            </a:r>
+            <a:r>
+              <a:rPr lang="zh-CN" altLang="en-US" dirty="0" smtClean="0"/>
+              <a:t>覆盖</a:t>
+            </a:r>
+            <a:endParaRPr lang="en-US" altLang="zh-CN" dirty="0"/>
+          </a:p>
+          <a:p>
+            <a:r>
+              <a:rPr lang="zh-CN" altLang="en-US" dirty="0" smtClean="0"/>
+              <a:t>叶子</a:t>
+            </a:r>
+            <a:r>
+              <a:rPr lang="zh-CN" altLang="en-US" dirty="0"/>
+              <a:t>节点要保证足够小，能在一个里程碑中</a:t>
+            </a:r>
+            <a:r>
+              <a:rPr lang="zh-CN" altLang="en-US" dirty="0" smtClean="0"/>
+              <a:t>完成</a:t>
+            </a:r>
+            <a:r>
+              <a:rPr lang="zh-CN" altLang="en-US" dirty="0"/>
+              <a:t>。在通常的软件项目中，叶节点的成本最好</a:t>
+            </a:r>
+            <a:r>
+              <a:rPr lang="zh-CN" altLang="en-US" dirty="0" smtClean="0"/>
+              <a:t>不要</a:t>
+            </a:r>
+            <a:r>
+              <a:rPr lang="zh-CN" altLang="en-US" dirty="0"/>
+              <a:t>超过两周</a:t>
+            </a:r>
+          </a:p>
+          <a:p>
+            <a:r>
+              <a:rPr lang="zh-CN" altLang="en-US" dirty="0"/>
+              <a:t>从结果</a:t>
+            </a:r>
+            <a:r>
+              <a:rPr lang="zh-CN" altLang="en-US" dirty="0" smtClean="0"/>
+              <a:t>（</a:t>
+            </a:r>
+            <a:r>
+              <a:rPr lang="en-US" altLang="zh-CN" dirty="0" smtClean="0"/>
+              <a:t>Outcome</a:t>
+            </a:r>
+            <a:r>
+              <a:rPr lang="zh-CN" altLang="en-US" dirty="0" smtClean="0"/>
+              <a:t>）</a:t>
+            </a:r>
+            <a:r>
+              <a:rPr lang="zh-CN" altLang="en-US" dirty="0"/>
+              <a:t>出发</a:t>
+            </a:r>
+            <a:r>
+              <a:rPr lang="zh-CN" altLang="en-US" dirty="0" smtClean="0"/>
+              <a:t>构建</a:t>
+            </a:r>
+            <a:r>
+              <a:rPr lang="en-US" altLang="zh-CN" dirty="0" smtClean="0"/>
+              <a:t>WBS</a:t>
+            </a:r>
+            <a:r>
+              <a:rPr lang="zh-CN" altLang="en-US" dirty="0" smtClean="0"/>
+              <a:t>，</a:t>
+            </a:r>
+            <a:r>
+              <a:rPr lang="zh-CN" altLang="en-US" dirty="0"/>
+              <a:t>而</a:t>
+            </a:r>
+            <a:r>
+              <a:rPr lang="zh-CN" altLang="en-US" dirty="0" smtClean="0"/>
+              <a:t>不是从</a:t>
+            </a:r>
+            <a:r>
+              <a:rPr lang="zh-CN" altLang="en-US" dirty="0"/>
+              <a:t>团队的活动</a:t>
+            </a:r>
+            <a:r>
+              <a:rPr lang="zh-CN" altLang="en-US" dirty="0" smtClean="0"/>
+              <a:t>（</a:t>
+            </a:r>
+            <a:r>
+              <a:rPr lang="en-US" altLang="zh-CN" dirty="0" smtClean="0"/>
+              <a:t>Action</a:t>
+            </a:r>
+            <a:r>
+              <a:rPr lang="zh-CN" altLang="en-US" dirty="0" smtClean="0"/>
+              <a:t>）出发</a:t>
+            </a:r>
+            <a:endParaRPr lang="zh-CN" altLang="en-US" dirty="0"/>
+          </a:p>
+        </p:txBody>
+      </p:sp>
+    </p:spTree>
+    <p:extLst>
+      <p:ext uri="{BB962C8B-B14F-4D97-AF65-F5344CB8AC3E}">
+        <p14:creationId xmlns:p14="http://schemas.microsoft.com/office/powerpoint/2010/main" val="1221635081"/>
+      </p:ext>
+    </p:extLst>
   </p:cSld>
   <p:clrMapOvr>
     <a:masterClrMapping/>
@@ -3064,7 +4323,14 @@
         <p:cNvGrpSpPr/>
         <p:nvPr/>
       </p:nvGrpSpPr>
-      <p:grpSpPr/>
+      <p:grpSpPr>
+        <a:xfrm>
+          <a:off x="0" y="0"/>
+          <a:ext cx="0" cy="0"/>
+          <a:chOff x="0" y="0"/>
+          <a:chExt cx="0" cy="0"/>
+        </a:xfrm>
+      </p:grpSpPr>
       <p:sp>
         <p:nvSpPr>
           <p:cNvPr id="2" name="标题 1"/>
@@ -3078,6 +4344,7 @@
         <p:spPr/>
         <p:txBody>
           <a:bodyPr/>
+          <a:lstStyle/>
           <a:p>
             <a:r>
               <a:rPr lang="zh-CN" altLang="en-US">
@@ -3102,6 +4369,7 @@
         <p:spPr/>
         <p:txBody>
           <a:bodyPr/>
+          <a:lstStyle/>
           <a:p>
             <a:r>
               <a:rPr lang="zh-CN" altLang="en-US"/>
@@ -3118,7 +4386,6 @@
               <a:rPr lang="zh-CN" altLang="en-US"/>
               <a:t>、需求捕捉</a:t>
             </a:r>
-            <a:endParaRPr lang="zh-CN" altLang="en-US"/>
           </a:p>
           <a:p>
             <a:r>
@@ -3129,7 +4396,6 @@
               <a:rPr lang="zh-CN" altLang="en-US"/>
               <a:t>、引导需求</a:t>
             </a:r>
-            <a:endParaRPr lang="zh-CN" altLang="en-US"/>
           </a:p>
           <a:p>
             <a:r>
@@ -3140,7 +4406,6 @@
               <a:rPr lang="zh-CN" altLang="en-US"/>
               <a:t>、挖掘需求</a:t>
             </a:r>
-            <a:endParaRPr lang="zh-CN" altLang="en-US"/>
           </a:p>
           <a:p>
             <a:r>
@@ -3151,7 +4416,6 @@
               <a:rPr lang="zh-CN" altLang="en-US"/>
               <a:t>、推测需求（快捷支付、音乐分享）</a:t>
             </a:r>
-            <a:endParaRPr lang="zh-CN" altLang="en-US"/>
           </a:p>
         </p:txBody>
       </p:sp>
@@ -3172,7 +4436,14 @@
         <p:cNvGrpSpPr/>
         <p:nvPr/>
       </p:nvGrpSpPr>
-      <p:grpSpPr/>
+      <p:grpSpPr>
+        <a:xfrm>
+          <a:off x="0" y="0"/>
+          <a:ext cx="0" cy="0"/>
+          <a:chOff x="0" y="0"/>
+          <a:chExt cx="0" cy="0"/>
+        </a:xfrm>
+      </p:grpSpPr>
       <p:sp>
         <p:nvSpPr>
           <p:cNvPr id="4" name="内容占位符 3"/>
@@ -3186,6 +4457,7 @@
         <p:spPr/>
         <p:txBody>
           <a:bodyPr/>
+          <a:lstStyle/>
           <a:p>
             <a:r>
               <a:rPr lang="zh-CN" altLang="en-US">
@@ -3209,7 +4481,7 @@
           <p:nvPr/>
         </p:nvPicPr>
         <p:blipFill>
-          <a:blip r:embed="rId1"/>
+          <a:blip r:embed="rId2"/>
           <a:stretch>
             <a:fillRect/>
           </a:stretch>
@@ -3241,7 +4513,14 @@
         <p:cNvGrpSpPr/>
         <p:nvPr/>
       </p:nvGrpSpPr>
-      <p:grpSpPr/>
+      <p:grpSpPr>
+        <a:xfrm>
+          <a:off x="0" y="0"/>
+          <a:ext cx="0" cy="0"/>
+          <a:chOff x="0" y="0"/>
+          <a:chExt cx="0" cy="0"/>
+        </a:xfrm>
+      </p:grpSpPr>
       <p:sp>
         <p:nvSpPr>
           <p:cNvPr id="2" name="内容占位符 1"/>
@@ -3255,12 +4534,12 @@
         <p:spPr/>
         <p:txBody>
           <a:bodyPr/>
+          <a:lstStyle/>
           <a:p>
             <a:r>
               <a:rPr lang="zh-CN" altLang="en-US"/>
               <a:t>技术团队需求</a:t>
             </a:r>
-            <a:endParaRPr lang="zh-CN" altLang="en-US"/>
           </a:p>
           <a:p>
             <a:pPr marL="0" indent="0">
@@ -3270,7 +4549,6 @@
               <a:rPr lang="zh-CN" altLang="en-US"/>
               <a:t>考虑软件的代码、架构、所依赖平台的长期演化的时候，会提出技术性的需求，包括代码的迁移、架构的演化、平台的变化，或者引入新的技术</a:t>
             </a:r>
-            <a:endParaRPr lang="zh-CN" altLang="en-US"/>
           </a:p>
         </p:txBody>
       </p:sp>
@@ -3291,7 +4569,14 @@
         <p:cNvGrpSpPr/>
         <p:nvPr/>
       </p:nvGrpSpPr>
-      <p:grpSpPr/>
+      <p:grpSpPr>
+        <a:xfrm>
+          <a:off x="0" y="0"/>
+          <a:ext cx="0" cy="0"/>
+          <a:chOff x="0" y="0"/>
+          <a:chExt cx="0" cy="0"/>
+        </a:xfrm>
+      </p:grpSpPr>
       <p:sp>
         <p:nvSpPr>
           <p:cNvPr id="3" name="标题 2"/>
@@ -3305,12 +4590,12 @@
         <p:spPr/>
         <p:txBody>
           <a:bodyPr/>
+          <a:lstStyle/>
           <a:p>
             <a:r>
               <a:rPr lang="zh-CN" altLang="en-US"/>
               <a:t>分析和定义需求</a:t>
             </a:r>
-            <a:endParaRPr lang="zh-CN" altLang="en-US"/>
           </a:p>
         </p:txBody>
       </p:sp>
@@ -3327,6 +4612,7 @@
         <p:spPr/>
         <p:txBody>
           <a:bodyPr/>
+          <a:lstStyle/>
           <a:p>
             <a:pPr marL="0" indent="0">
               <a:buNone/>
@@ -3335,7 +4621,6 @@
               <a:rPr lang="zh-CN" altLang="en-US"/>
               <a:t>从各个方面获取的需求进行规整，定义需求的内涵，从各个角度将需求量化（需求实现的最后期限，实现需求大致所需的时间和资源成本，各个不同需求的优先级，需求带来的收益，等等）</a:t>
             </a:r>
-            <a:endParaRPr lang="zh-CN" altLang="en-US"/>
           </a:p>
         </p:txBody>
       </p:sp>
@@ -3356,7 +4641,14 @@
         <p:cNvGrpSpPr/>
         <p:nvPr/>
       </p:nvGrpSpPr>
-      <p:grpSpPr/>
+      <p:grpSpPr>
+        <a:xfrm>
+          <a:off x="0" y="0"/>
+          <a:ext cx="0" cy="0"/>
+          <a:chOff x="0" y="0"/>
+          <a:chExt cx="0" cy="0"/>
+        </a:xfrm>
+      </p:grpSpPr>
       <p:sp>
         <p:nvSpPr>
           <p:cNvPr id="2" name="标题 1"/>
@@ -3370,12 +4662,12 @@
         <p:spPr/>
         <p:txBody>
           <a:bodyPr/>
+          <a:lstStyle/>
           <a:p>
             <a:r>
               <a:rPr lang="zh-CN" altLang="en-US"/>
               <a:t>验证需求</a:t>
             </a:r>
-            <a:endParaRPr lang="zh-CN" altLang="en-US"/>
           </a:p>
         </p:txBody>
       </p:sp>
@@ -3392,6 +4684,7 @@
         <p:spPr/>
         <p:txBody>
           <a:bodyPr/>
+          <a:lstStyle/>
           <a:p>
             <a:pPr marL="0" indent="0">
               <a:buNone/>
@@ -3400,7 +4693,6 @@
               <a:rPr lang="zh-CN" altLang="en-US"/>
               <a:t>软件团队要跟利益相关者沟通，通过分析报告、技术原型、用户调查或演示等形式向他们验证软件团队对于这些需求的认知</a:t>
             </a:r>
-            <a:endParaRPr lang="zh-CN" altLang="en-US"/>
           </a:p>
         </p:txBody>
       </p:sp>
@@ -3421,7 +4713,14 @@
         <p:cNvGrpSpPr/>
         <p:nvPr/>
       </p:nvGrpSpPr>
-      <p:grpSpPr/>
+      <p:grpSpPr>
+        <a:xfrm>
+          <a:off x="0" y="0"/>
+          <a:ext cx="0" cy="0"/>
+          <a:chOff x="0" y="0"/>
+          <a:chExt cx="0" cy="0"/>
+        </a:xfrm>
+      </p:grpSpPr>
       <p:sp>
         <p:nvSpPr>
           <p:cNvPr id="2" name="标题 1"/>
@@ -3435,12 +4734,12 @@
         <p:spPr/>
         <p:txBody>
           <a:bodyPr/>
+          <a:lstStyle/>
           <a:p>
             <a:r>
               <a:rPr lang="zh-CN" altLang="en-US"/>
               <a:t>在软件产品的生命周期中管理需求</a:t>
             </a:r>
-            <a:endParaRPr lang="zh-CN" altLang="en-US"/>
           </a:p>
         </p:txBody>
       </p:sp>
@@ -3457,6 +4756,7 @@
         <p:spPr/>
         <p:txBody>
           <a:bodyPr/>
+          <a:lstStyle/>
           <a:p>
             <a:pPr marL="0" indent="0">
               <a:buNone/>
@@ -3465,7 +4765,6 @@
               <a:rPr lang="zh-CN" altLang="en-US"/>
               <a:t>在软件的生命周期中，需求在发生变化，技术在发展，团队成员的能力也在提高。原来认为重要的事情可能不再重要，有些功能原来技术上很难实现，现在出现了捷径，一些相关的法规会发生变化，外部的合作伙伴突然发生变化，这些都要求我们不断对需求进行重新审核并做出相应的调整</a:t>
             </a:r>
-            <a:endParaRPr lang="zh-CN" altLang="en-US"/>
           </a:p>
         </p:txBody>
       </p:sp>
@@ -3486,7 +4785,14 @@
         <p:cNvGrpSpPr/>
         <p:nvPr/>
       </p:nvGrpSpPr>
-      <p:grpSpPr/>
+      <p:grpSpPr>
+        <a:xfrm>
+          <a:off x="0" y="0"/>
+          <a:ext cx="0" cy="0"/>
+          <a:chOff x="0" y="0"/>
+          <a:chExt cx="0" cy="0"/>
+        </a:xfrm>
+      </p:grpSpPr>
       <p:sp>
         <p:nvSpPr>
           <p:cNvPr id="2" name="标题 1"/>
@@ -3500,12 +4806,12 @@
         <p:spPr/>
         <p:txBody>
           <a:bodyPr/>
+          <a:lstStyle/>
           <a:p>
             <a:r>
               <a:rPr lang="zh-CN" altLang="en-US"/>
               <a:t>软件产品的利益相关者</a:t>
             </a:r>
-            <a:endParaRPr lang="zh-CN" altLang="en-US"/>
           </a:p>
         </p:txBody>
       </p:sp>
@@ -3522,6 +4828,7 @@
         <p:spPr/>
         <p:txBody>
           <a:bodyPr/>
+          <a:lstStyle/>
           <a:p>
             <a:pPr marL="0" indent="0">
               <a:buNone/>
@@ -3563,13 +4870,13 @@
         </p:style>
         <p:txBody>
           <a:bodyPr rtlCol="0" anchor="ctr"/>
+          <a:lstStyle/>
           <a:p>
             <a:pPr algn="ctr"/>
             <a:r>
               <a:rPr lang="zh-CN" altLang="en-US" sz="3200" b="1"/>
               <a:t>利益相关者</a:t>
             </a:r>
-            <a:endParaRPr lang="zh-CN" altLang="en-US" sz="3200" b="1"/>
           </a:p>
         </p:txBody>
       </p:sp>
@@ -3606,13 +4913,13 @@
         </p:style>
         <p:txBody>
           <a:bodyPr rtlCol="0" anchor="ctr"/>
+          <a:lstStyle/>
           <a:p>
             <a:pPr algn="ctr"/>
             <a:r>
               <a:rPr lang="zh-CN" altLang="en-US" sz="3200" b="1"/>
               <a:t>用户</a:t>
             </a:r>
-            <a:endParaRPr lang="zh-CN" altLang="en-US" sz="3200" b="1"/>
           </a:p>
         </p:txBody>
       </p:sp>
@@ -3649,13 +4956,13 @@
         </p:style>
         <p:txBody>
           <a:bodyPr rtlCol="0" anchor="ctr"/>
+          <a:lstStyle/>
           <a:p>
             <a:pPr algn="ctr"/>
             <a:r>
               <a:rPr lang="zh-CN" altLang="en-US" sz="3200" b="1"/>
               <a:t>顾客</a:t>
             </a:r>
-            <a:endParaRPr lang="zh-CN" altLang="en-US" sz="3200" b="1"/>
           </a:p>
         </p:txBody>
       </p:sp>
@@ -3692,13 +4999,13 @@
         </p:style>
         <p:txBody>
           <a:bodyPr rtlCol="0" anchor="ctr"/>
+          <a:lstStyle/>
           <a:p>
             <a:pPr algn="ctr"/>
             <a:r>
               <a:rPr lang="zh-CN" altLang="en-US" sz="3200" b="1"/>
               <a:t>市场分析师</a:t>
             </a:r>
-            <a:endParaRPr lang="zh-CN" altLang="en-US" sz="3200" b="1"/>
           </a:p>
         </p:txBody>
       </p:sp>
@@ -3735,13 +5042,13 @@
         </p:style>
         <p:txBody>
           <a:bodyPr rtlCol="0" anchor="ctr"/>
+          <a:lstStyle/>
           <a:p>
             <a:pPr algn="ctr"/>
             <a:r>
               <a:rPr lang="zh-CN" altLang="en-US" sz="3200" b="1"/>
               <a:t>监管部门</a:t>
             </a:r>
-            <a:endParaRPr lang="zh-CN" altLang="en-US" sz="3200" b="1"/>
           </a:p>
         </p:txBody>
       </p:sp>
@@ -3778,13 +5085,13 @@
         </p:style>
         <p:txBody>
           <a:bodyPr rtlCol="0" anchor="ctr"/>
+          <a:lstStyle/>
           <a:p>
             <a:pPr algn="ctr"/>
             <a:r>
               <a:rPr lang="zh-CN" altLang="en-US" sz="3200" b="1"/>
               <a:t>软件工程师</a:t>
             </a:r>
-            <a:endParaRPr lang="zh-CN" altLang="en-US" sz="3200" b="1"/>
           </a:p>
         </p:txBody>
       </p:sp>
@@ -4210,9 +5517,11 @@
       </a:bgFillStyleLst>
     </a:fmtScheme>
   </a:themeElements>
+  <a:objectDefaults/>
+  <a:extraClrSchemeLst/>
   <a:extLst>
     <a:ext uri="{05A4C25C-085E-4340-85A3-A5531E510DB2}">
-      <thm15:themeFamily xmlns:thm15="http://schemas.microsoft.com/office/thememl/2012/main" name="Office Theme" id="{62F939B6-93AF-4DB8-9C6B-D6C7DFDC589F}" vid="{4A3C46E8-61CC-4603-A589-7422A47A8E4A}"/>
+      <thm15:themeFamily xmlns:thm15="http://schemas.microsoft.com/office/thememl/2012/main" xmlns="" name="Office Theme" id="{62F939B6-93AF-4DB8-9C6B-D6C7DFDC589F}" vid="{4A3C46E8-61CC-4603-A589-7422A47A8E4A}"/>
     </a:ext>
   </a:extLst>
 </a:theme>

</xml_diff>